<commit_message>
docs :git reset revert 문서 내용 보강
- 실제 사례 재연 내용 추가
</commit_message>
<xml_diff>
--- a/docs/8. git reset과 revert.pptx
+++ b/docs/8. git reset과 revert.pptx
@@ -5,7 +5,7 @@
     <p:sldMasterId id="2147483648" r:id="rId1"/>
   </p:sldMasterIdLst>
   <p:notesMasterIdLst>
-    <p:notesMasterId r:id="rId47"/>
+    <p:notesMasterId r:id="rId52"/>
   </p:notesMasterIdLst>
   <p:sldIdLst>
     <p:sldId id="257" r:id="rId2"/>
@@ -51,8 +51,13 @@
     <p:sldId id="361" r:id="rId42"/>
     <p:sldId id="336" r:id="rId43"/>
     <p:sldId id="363" r:id="rId44"/>
-    <p:sldId id="260" r:id="rId45"/>
-    <p:sldId id="262" r:id="rId46"/>
+    <p:sldId id="364" r:id="rId45"/>
+    <p:sldId id="365" r:id="rId46"/>
+    <p:sldId id="366" r:id="rId47"/>
+    <p:sldId id="367" r:id="rId48"/>
+    <p:sldId id="368" r:id="rId49"/>
+    <p:sldId id="260" r:id="rId50"/>
+    <p:sldId id="262" r:id="rId51"/>
   </p:sldIdLst>
   <p:sldSz cx="12192000" cy="6858000"/>
   <p:notesSz cx="6858000" cy="9144000"/>
@@ -1492,7 +1497,7 @@
           <a:p>
             <a:fld id="{EFBA5509-D1D1-47CF-BFB7-E1AA9548D41D}" type="datetimeFigureOut">
               <a:rPr lang="ko-KR" altLang="en-US" smtClean="0"/>
-              <a:t>2022-12-21</a:t>
+              <a:t>2022-12-26</a:t>
             </a:fld>
             <a:endParaRPr lang="ko-KR" altLang="en-US"/>
           </a:p>
@@ -4679,7 +4684,7 @@
           <a:p>
             <a:fld id="{2E2D5BC7-3CC9-4CF8-9043-E85E9F2EC4FF}" type="datetimeFigureOut">
               <a:rPr lang="ko-KR" altLang="en-US" smtClean="0"/>
-              <a:t>2022-12-21</a:t>
+              <a:t>2022-12-26</a:t>
             </a:fld>
             <a:endParaRPr lang="ko-KR" altLang="en-US"/>
           </a:p>
@@ -4877,7 +4882,7 @@
           <a:p>
             <a:fld id="{2E2D5BC7-3CC9-4CF8-9043-E85E9F2EC4FF}" type="datetimeFigureOut">
               <a:rPr lang="ko-KR" altLang="en-US" smtClean="0"/>
-              <a:t>2022-12-21</a:t>
+              <a:t>2022-12-26</a:t>
             </a:fld>
             <a:endParaRPr lang="ko-KR" altLang="en-US"/>
           </a:p>
@@ -5085,7 +5090,7 @@
           <a:p>
             <a:fld id="{2E2D5BC7-3CC9-4CF8-9043-E85E9F2EC4FF}" type="datetimeFigureOut">
               <a:rPr lang="ko-KR" altLang="en-US" smtClean="0"/>
-              <a:t>2022-12-21</a:t>
+              <a:t>2022-12-26</a:t>
             </a:fld>
             <a:endParaRPr lang="ko-KR" altLang="en-US"/>
           </a:p>
@@ -5283,7 +5288,7 @@
           <a:p>
             <a:fld id="{2E2D5BC7-3CC9-4CF8-9043-E85E9F2EC4FF}" type="datetimeFigureOut">
               <a:rPr lang="ko-KR" altLang="en-US" smtClean="0"/>
-              <a:t>2022-12-21</a:t>
+              <a:t>2022-12-26</a:t>
             </a:fld>
             <a:endParaRPr lang="ko-KR" altLang="en-US"/>
           </a:p>
@@ -5558,7 +5563,7 @@
           <a:p>
             <a:fld id="{2E2D5BC7-3CC9-4CF8-9043-E85E9F2EC4FF}" type="datetimeFigureOut">
               <a:rPr lang="ko-KR" altLang="en-US" smtClean="0"/>
-              <a:t>2022-12-21</a:t>
+              <a:t>2022-12-26</a:t>
             </a:fld>
             <a:endParaRPr lang="ko-KR" altLang="en-US"/>
           </a:p>
@@ -5823,7 +5828,7 @@
           <a:p>
             <a:fld id="{2E2D5BC7-3CC9-4CF8-9043-E85E9F2EC4FF}" type="datetimeFigureOut">
               <a:rPr lang="ko-KR" altLang="en-US" smtClean="0"/>
-              <a:t>2022-12-21</a:t>
+              <a:t>2022-12-26</a:t>
             </a:fld>
             <a:endParaRPr lang="ko-KR" altLang="en-US"/>
           </a:p>
@@ -6235,7 +6240,7 @@
           <a:p>
             <a:fld id="{2E2D5BC7-3CC9-4CF8-9043-E85E9F2EC4FF}" type="datetimeFigureOut">
               <a:rPr lang="ko-KR" altLang="en-US" smtClean="0"/>
-              <a:t>2022-12-21</a:t>
+              <a:t>2022-12-26</a:t>
             </a:fld>
             <a:endParaRPr lang="ko-KR" altLang="en-US"/>
           </a:p>
@@ -6376,7 +6381,7 @@
           <a:p>
             <a:fld id="{2E2D5BC7-3CC9-4CF8-9043-E85E9F2EC4FF}" type="datetimeFigureOut">
               <a:rPr lang="ko-KR" altLang="en-US" smtClean="0"/>
-              <a:t>2022-12-21</a:t>
+              <a:t>2022-12-26</a:t>
             </a:fld>
             <a:endParaRPr lang="ko-KR" altLang="en-US"/>
           </a:p>
@@ -6489,7 +6494,7 @@
           <a:p>
             <a:fld id="{2E2D5BC7-3CC9-4CF8-9043-E85E9F2EC4FF}" type="datetimeFigureOut">
               <a:rPr lang="ko-KR" altLang="en-US" smtClean="0"/>
-              <a:t>2022-12-21</a:t>
+              <a:t>2022-12-26</a:t>
             </a:fld>
             <a:endParaRPr lang="ko-KR" altLang="en-US"/>
           </a:p>
@@ -6800,7 +6805,7 @@
           <a:p>
             <a:fld id="{2E2D5BC7-3CC9-4CF8-9043-E85E9F2EC4FF}" type="datetimeFigureOut">
               <a:rPr lang="ko-KR" altLang="en-US" smtClean="0"/>
-              <a:t>2022-12-21</a:t>
+              <a:t>2022-12-26</a:t>
             </a:fld>
             <a:endParaRPr lang="ko-KR" altLang="en-US"/>
           </a:p>
@@ -7088,7 +7093,7 @@
           <a:p>
             <a:fld id="{2E2D5BC7-3CC9-4CF8-9043-E85E9F2EC4FF}" type="datetimeFigureOut">
               <a:rPr lang="ko-KR" altLang="en-US" smtClean="0"/>
-              <a:t>2022-12-21</a:t>
+              <a:t>2022-12-26</a:t>
             </a:fld>
             <a:endParaRPr lang="ko-KR" altLang="en-US"/>
           </a:p>
@@ -7329,7 +7334,7 @@
           <a:p>
             <a:fld id="{2E2D5BC7-3CC9-4CF8-9043-E85E9F2EC4FF}" type="datetimeFigureOut">
               <a:rPr lang="ko-KR" altLang="en-US" smtClean="0"/>
-              <a:t>2022-12-21</a:t>
+              <a:t>2022-12-26</a:t>
             </a:fld>
             <a:endParaRPr lang="ko-KR" altLang="en-US"/>
           </a:p>
@@ -31803,8 +31808,8 @@
         </p:nvSpPr>
         <p:spPr>
           <a:xfrm>
-            <a:off x="2543634" y="6124014"/>
-            <a:ext cx="6476453" cy="369332"/>
+            <a:off x="1269859" y="5999446"/>
+            <a:ext cx="8863260" cy="646331"/>
           </a:xfrm>
           <a:prstGeom prst="rect">
             <a:avLst/>
@@ -31913,18 +31918,56 @@
           <a:p>
             <a:pPr algn="ctr"/>
             <a:r>
-              <a:rPr lang="ko-KR" altLang="en-US" dirty="0"/>
-              <a:t>평화롭게 공부하고 있던 어느 날 갑자기 </a:t>
-            </a:r>
-            <a:r>
               <a:rPr lang="en-US" altLang="ko-KR" dirty="0"/>
               <a:t>commit</a:t>
             </a:r>
             <a:r>
               <a:rPr lang="ko-KR" altLang="en-US" dirty="0"/>
-              <a:t>해야만 뜨는 </a:t>
-            </a:r>
-            <a:endParaRPr lang="en-US" altLang="ko-KR" dirty="0"/>
+              <a:t>한 적도 없는데 갑자기 </a:t>
+            </a:r>
+            <a:r>
+              <a:rPr lang="en-US" altLang="ko-KR" dirty="0"/>
+              <a:t>push</a:t>
+            </a:r>
+            <a:r>
+              <a:rPr lang="ko-KR" altLang="en-US" dirty="0"/>
+              <a:t>할 게 떠서 당황스러웠던 적이 있어요</a:t>
+            </a:r>
+            <a:r>
+              <a:rPr lang="en-US" altLang="ko-KR" dirty="0"/>
+              <a:t>.</a:t>
+            </a:r>
+          </a:p>
+          <a:p>
+            <a:pPr algn="ctr"/>
+            <a:r>
+              <a:rPr lang="ko-KR" altLang="en-US" dirty="0"/>
+              <a:t>알고 보니 다른 분이 </a:t>
+            </a:r>
+            <a:r>
+              <a:rPr lang="en-US" altLang="ko-KR" dirty="0"/>
+              <a:t>reset</a:t>
+            </a:r>
+            <a:r>
+              <a:rPr lang="ko-KR" altLang="en-US" dirty="0"/>
+              <a:t>후 강제 </a:t>
+            </a:r>
+            <a:r>
+              <a:rPr lang="ko-KR" altLang="en-US" dirty="0" err="1"/>
+              <a:t>푸시하여</a:t>
+            </a:r>
+            <a:r>
+              <a:rPr lang="ko-KR" altLang="en-US" dirty="0"/>
+              <a:t> 이력이 날라갔기에 발생했던 </a:t>
+            </a:r>
+            <a:r>
+              <a:rPr lang="ko-KR" altLang="en-US" dirty="0" err="1"/>
+              <a:t>일이였어요</a:t>
+            </a:r>
+            <a:r>
+              <a:rPr lang="en-US" altLang="ko-KR" dirty="0"/>
+              <a:t>.</a:t>
+            </a:r>
           </a:p>
         </p:txBody>
       </p:sp>
@@ -31972,8 +32015,8 @@
         </p:nvSpPr>
         <p:spPr>
           <a:xfrm>
-            <a:off x="806751" y="253628"/>
-            <a:ext cx="10578538" cy="584775"/>
+            <a:off x="4419120" y="253628"/>
+            <a:ext cx="3353803" cy="584775"/>
           </a:xfrm>
           <a:prstGeom prst="rect">
             <a:avLst/>
@@ -31989,33 +32032,37 @@
             <a:pPr algn="ctr"/>
             <a:r>
               <a:rPr lang="en-US" altLang="ko-KR" sz="3200" dirty="0"/>
-              <a:t>[commit</a:t>
+              <a:t>[</a:t>
+            </a:r>
+            <a:r>
+              <a:rPr lang="ko-KR" altLang="en-US" sz="3200" dirty="0" err="1"/>
+              <a:t>상황재연</a:t>
             </a:r>
             <a:r>
               <a:rPr lang="ko-KR" altLang="en-US" sz="3200" dirty="0"/>
-              <a:t>하지도 않았는데 갑자기 </a:t>
+              <a:t> </a:t>
             </a:r>
             <a:r>
               <a:rPr lang="en-US" altLang="ko-KR" sz="3200" dirty="0"/>
-              <a:t>push</a:t>
+              <a:t>- </a:t>
             </a:r>
             <a:r>
               <a:rPr lang="ko-KR" altLang="en-US" sz="3200" dirty="0"/>
-              <a:t>할 게 있다고 떠요</a:t>
+              <a:t>세팅</a:t>
             </a:r>
             <a:r>
               <a:rPr lang="en-US" altLang="ko-KR" sz="3200" dirty="0"/>
-              <a:t>.]</a:t>
-            </a:r>
-          </a:p>
-        </p:txBody>
-      </p:sp>
-      <p:sp>
-        <p:nvSpPr>
-          <p:cNvPr id="14" name="TextBox 2">
-            <a:extLst>
-              <a:ext uri="{FF2B5EF4-FFF2-40B4-BE49-F238E27FC236}">
-                <a16:creationId xmlns:a16="http://schemas.microsoft.com/office/drawing/2014/main" id="{1767D1E8-0410-F561-0373-3E20D277D74B}"/>
+              <a:t>]</a:t>
+            </a:r>
+          </a:p>
+        </p:txBody>
+      </p:sp>
+      <p:sp>
+        <p:nvSpPr>
+          <p:cNvPr id="4" name="TextBox 2">
+            <a:extLst>
+              <a:ext uri="{FF2B5EF4-FFF2-40B4-BE49-F238E27FC236}">
+                <a16:creationId xmlns:a16="http://schemas.microsoft.com/office/drawing/2014/main" id="{1244FB8D-F7D1-60E7-72B4-8B2DA7253DAA}"/>
               </a:ext>
             </a:extLst>
           </p:cNvPr>
@@ -32024,8 +32071,8 @@
         </p:nvSpPr>
         <p:spPr>
           <a:xfrm>
-            <a:off x="2543634" y="6124014"/>
-            <a:ext cx="6476453" cy="369332"/>
+            <a:off x="2715153" y="6124014"/>
+            <a:ext cx="6133410" cy="369332"/>
           </a:xfrm>
           <a:prstGeom prst="rect">
             <a:avLst/>
@@ -32134,21 +32181,58 @@
           <a:p>
             <a:pPr algn="ctr"/>
             <a:r>
+              <a:rPr lang="ko-KR" altLang="en-US" dirty="0" err="1"/>
+              <a:t>소스트리에서</a:t>
+            </a:r>
+            <a:r>
               <a:rPr lang="ko-KR" altLang="en-US" dirty="0"/>
-              <a:t>평화롭게 공부하고 있던 어느 날 갑자기 </a:t>
+              <a:t> 강제 </a:t>
+            </a:r>
+            <a:r>
+              <a:rPr lang="ko-KR" altLang="en-US" dirty="0" err="1"/>
+              <a:t>푸시가</a:t>
+            </a:r>
+            <a:r>
+              <a:rPr lang="ko-KR" altLang="en-US" dirty="0"/>
+              <a:t> 가능하도록 옵션을 활성화한다</a:t>
             </a:r>
             <a:r>
               <a:rPr lang="en-US" altLang="ko-KR" dirty="0"/>
-              <a:t>commit</a:t>
-            </a:r>
-            <a:r>
-              <a:rPr lang="ko-KR" altLang="en-US" dirty="0"/>
-              <a:t>해야만 뜨는 </a:t>
-            </a:r>
-            <a:endParaRPr lang="en-US" altLang="ko-KR" dirty="0"/>
-          </a:p>
-        </p:txBody>
-      </p:sp>
+              <a:t>.</a:t>
+            </a:r>
+          </a:p>
+        </p:txBody>
+      </p:sp>
+      <p:pic>
+        <p:nvPicPr>
+          <p:cNvPr id="6" name="그림 5">
+            <a:extLst>
+              <a:ext uri="{FF2B5EF4-FFF2-40B4-BE49-F238E27FC236}">
+                <a16:creationId xmlns:a16="http://schemas.microsoft.com/office/drawing/2014/main" id="{44AEF4E4-4BAC-56DE-568D-1B7E9BB4E5D9}"/>
+              </a:ext>
+            </a:extLst>
+          </p:cNvPr>
+          <p:cNvPicPr>
+            <a:picLocks noChangeAspect="1"/>
+          </p:cNvPicPr>
+          <p:nvPr/>
+        </p:nvPicPr>
+        <p:blipFill>
+          <a:blip r:embed="rId2"/>
+          <a:stretch>
+            <a:fillRect/>
+          </a:stretch>
+        </p:blipFill>
+        <p:spPr>
+          <a:xfrm>
+            <a:off x="3487272" y="1131102"/>
+            <a:ext cx="5217456" cy="4644355"/>
+          </a:xfrm>
+          <a:prstGeom prst="rect">
+            <a:avLst/>
+          </a:prstGeom>
+        </p:spPr>
+      </p:pic>
     </p:spTree>
     <p:extLst>
       <p:ext uri="{BB962C8B-B14F-4D97-AF65-F5344CB8AC3E}">
@@ -32181,10 +32265,10 @@
       </p:grpSpPr>
       <p:sp>
         <p:nvSpPr>
-          <p:cNvPr id="4" name="TextBox 3">
-            <a:extLst>
-              <a:ext uri="{FF2B5EF4-FFF2-40B4-BE49-F238E27FC236}">
-                <a16:creationId xmlns:a16="http://schemas.microsoft.com/office/drawing/2014/main" id="{0B8A8028-DD3B-7E10-8056-3225EDF81E52}"/>
+          <p:cNvPr id="2" name="TextBox 1">
+            <a:extLst>
+              <a:ext uri="{FF2B5EF4-FFF2-40B4-BE49-F238E27FC236}">
+                <a16:creationId xmlns:a16="http://schemas.microsoft.com/office/drawing/2014/main" id="{8B9E4CAA-6677-0803-D0CB-1724DCCE63B4}"/>
               </a:ext>
             </a:extLst>
           </p:cNvPr>
@@ -32193,8 +32277,8 @@
         </p:nvSpPr>
         <p:spPr>
           <a:xfrm>
-            <a:off x="167391" y="447994"/>
-            <a:ext cx="3021981" cy="830997"/>
+            <a:off x="5057915" y="253628"/>
+            <a:ext cx="2076209" cy="584775"/>
           </a:xfrm>
           <a:prstGeom prst="rect">
             <a:avLst/>
@@ -32209,27 +32293,26 @@
           <a:p>
             <a:pPr algn="ctr"/>
             <a:r>
-              <a:rPr lang="en-US" altLang="ko-KR" sz="4800" dirty="0"/>
+              <a:rPr lang="en-US" altLang="ko-KR" sz="3200" dirty="0"/>
               <a:t>[</a:t>
             </a:r>
             <a:r>
-              <a:rPr lang="ko-KR" altLang="en-US" sz="4800" dirty="0"/>
-              <a:t>참고문헌</a:t>
-            </a:r>
-            <a:r>
-              <a:rPr lang="en-US" altLang="ko-KR" sz="4800" dirty="0"/>
+              <a:rPr lang="ko-KR" altLang="en-US" sz="3200" dirty="0" err="1"/>
+              <a:t>상황재연</a:t>
+            </a:r>
+            <a:r>
+              <a:rPr lang="en-US" altLang="ko-KR" sz="3200" dirty="0"/>
               <a:t>]</a:t>
             </a:r>
-            <a:endParaRPr lang="ko-KR" altLang="en-US" sz="4800" dirty="0"/>
-          </a:p>
-        </p:txBody>
-      </p:sp>
-      <p:sp>
-        <p:nvSpPr>
-          <p:cNvPr id="2" name="TextBox 1">
-            <a:extLst>
-              <a:ext uri="{FF2B5EF4-FFF2-40B4-BE49-F238E27FC236}">
-                <a16:creationId xmlns:a16="http://schemas.microsoft.com/office/drawing/2014/main" id="{DCC4737D-F156-02B4-C0DE-1108B5AE9B2D}"/>
+          </a:p>
+        </p:txBody>
+      </p:sp>
+      <p:sp>
+        <p:nvSpPr>
+          <p:cNvPr id="4" name="TextBox 2">
+            <a:extLst>
+              <a:ext uri="{FF2B5EF4-FFF2-40B4-BE49-F238E27FC236}">
+                <a16:creationId xmlns:a16="http://schemas.microsoft.com/office/drawing/2014/main" id="{1244FB8D-F7D1-60E7-72B4-8B2DA7253DAA}"/>
               </a:ext>
             </a:extLst>
           </p:cNvPr>
@@ -32238,8 +32321,8 @@
         </p:nvSpPr>
         <p:spPr>
           <a:xfrm>
-            <a:off x="243444" y="1653170"/>
-            <a:ext cx="6538778" cy="646331"/>
+            <a:off x="1248644" y="5650264"/>
+            <a:ext cx="9066456" cy="646331"/>
           </a:xfrm>
           <a:prstGeom prst="rect">
             <a:avLst/>
@@ -32250,809 +32333,243 @@
           <a:bodyPr wrap="none" rtlCol="0">
             <a:spAutoFit/>
           </a:bodyPr>
-          <a:lstStyle/>
-          <a:p>
-            <a:r>
-              <a:rPr lang="en-US" altLang="ko-KR" b="0" i="0" dirty="0">
-                <a:solidFill>
-                  <a:srgbClr val="222222"/>
-                </a:solidFill>
-                <a:effectLst/>
-                <a:latin typeface="Noto Sans Medium"/>
-              </a:rPr>
-              <a:t>njs04210, “[Git] reset</a:t>
-            </a:r>
-            <a:r>
-              <a:rPr lang="ko-KR" altLang="en-US" b="0" i="0" dirty="0">
-                <a:solidFill>
-                  <a:srgbClr val="222222"/>
-                </a:solidFill>
-                <a:effectLst/>
-                <a:latin typeface="Noto Sans Medium"/>
-              </a:rPr>
-              <a:t>과 </a:t>
-            </a:r>
-            <a:r>
-              <a:rPr lang="en-US" altLang="ko-KR" b="0" i="0" dirty="0">
-                <a:solidFill>
-                  <a:srgbClr val="222222"/>
-                </a:solidFill>
-                <a:effectLst/>
-                <a:latin typeface="Noto Sans Medium"/>
-              </a:rPr>
-              <a:t>revert </a:t>
-            </a:r>
-            <a:r>
-              <a:rPr lang="ko-KR" altLang="en-US" b="0" i="0" dirty="0">
-                <a:solidFill>
-                  <a:srgbClr val="222222"/>
-                </a:solidFill>
-                <a:effectLst/>
-                <a:latin typeface="Noto Sans Medium"/>
-              </a:rPr>
-              <a:t>알고 사용하기</a:t>
-            </a:r>
-            <a:r>
-              <a:rPr lang="en-US" altLang="ko-KR" b="0" i="0" dirty="0">
-                <a:solidFill>
-                  <a:srgbClr val="222222"/>
-                </a:solidFill>
-                <a:effectLst/>
-                <a:latin typeface="Noto Sans Medium"/>
-              </a:rPr>
-              <a:t>”, </a:t>
-            </a:r>
-            <a:r>
-              <a:rPr lang="en-US" altLang="ko-KR" b="0" i="0" dirty="0" err="1">
-                <a:solidFill>
-                  <a:srgbClr val="222222"/>
-                </a:solidFill>
-                <a:effectLst/>
-                <a:latin typeface="Noto Sans Medium"/>
-              </a:rPr>
-              <a:t>velog</a:t>
-            </a:r>
-            <a:r>
-              <a:rPr lang="en-US" altLang="ko-KR" b="0" i="0" dirty="0">
-                <a:solidFill>
-                  <a:srgbClr val="222222"/>
-                </a:solidFill>
-                <a:effectLst/>
-                <a:latin typeface="Noto Sans Medium"/>
-              </a:rPr>
-              <a:t>, 2021.01.12.,</a:t>
-            </a:r>
-          </a:p>
-          <a:p>
-            <a:r>
-              <a:rPr lang="en-US" altLang="ko-KR" dirty="0">
-                <a:solidFill>
-                  <a:srgbClr val="222222"/>
-                </a:solidFill>
-                <a:latin typeface="Noto Sans Medium"/>
-              </a:rPr>
+          <a:lstStyle>
+            <a:defPPr>
+              <a:defRPr lang="ko-KR"/>
+            </a:defPPr>
+            <a:lvl1pPr marL="0" algn="l" defTabSz="914400" rtl="0" eaLnBrk="1" latinLnBrk="1" hangingPunct="1">
+              <a:defRPr sz="1800" kern="1200">
+                <a:solidFill>
+                  <a:schemeClr val="tx1"/>
+                </a:solidFill>
+                <a:latin typeface="+mn-lt"/>
+                <a:ea typeface="+mn-ea"/>
+                <a:cs typeface="+mn-cs"/>
+              </a:defRPr>
+            </a:lvl1pPr>
+            <a:lvl2pPr marL="457200" algn="l" defTabSz="914400" rtl="0" eaLnBrk="1" latinLnBrk="1" hangingPunct="1">
+              <a:defRPr sz="1800" kern="1200">
+                <a:solidFill>
+                  <a:schemeClr val="tx1"/>
+                </a:solidFill>
+                <a:latin typeface="+mn-lt"/>
+                <a:ea typeface="+mn-ea"/>
+                <a:cs typeface="+mn-cs"/>
+              </a:defRPr>
+            </a:lvl2pPr>
+            <a:lvl3pPr marL="914400" algn="l" defTabSz="914400" rtl="0" eaLnBrk="1" latinLnBrk="1" hangingPunct="1">
+              <a:defRPr sz="1800" kern="1200">
+                <a:solidFill>
+                  <a:schemeClr val="tx1"/>
+                </a:solidFill>
+                <a:latin typeface="+mn-lt"/>
+                <a:ea typeface="+mn-ea"/>
+                <a:cs typeface="+mn-cs"/>
+              </a:defRPr>
+            </a:lvl3pPr>
+            <a:lvl4pPr marL="1371600" algn="l" defTabSz="914400" rtl="0" eaLnBrk="1" latinLnBrk="1" hangingPunct="1">
+              <a:defRPr sz="1800" kern="1200">
+                <a:solidFill>
+                  <a:schemeClr val="tx1"/>
+                </a:solidFill>
+                <a:latin typeface="+mn-lt"/>
+                <a:ea typeface="+mn-ea"/>
+                <a:cs typeface="+mn-cs"/>
+              </a:defRPr>
+            </a:lvl4pPr>
+            <a:lvl5pPr marL="1828800" algn="l" defTabSz="914400" rtl="0" eaLnBrk="1" latinLnBrk="1" hangingPunct="1">
+              <a:defRPr sz="1800" kern="1200">
+                <a:solidFill>
+                  <a:schemeClr val="tx1"/>
+                </a:solidFill>
+                <a:latin typeface="+mn-lt"/>
+                <a:ea typeface="+mn-ea"/>
+                <a:cs typeface="+mn-cs"/>
+              </a:defRPr>
+            </a:lvl5pPr>
+            <a:lvl6pPr marL="2286000" algn="l" defTabSz="914400" rtl="0" eaLnBrk="1" latinLnBrk="1" hangingPunct="1">
+              <a:defRPr sz="1800" kern="1200">
+                <a:solidFill>
+                  <a:schemeClr val="tx1"/>
+                </a:solidFill>
+                <a:latin typeface="+mn-lt"/>
+                <a:ea typeface="+mn-ea"/>
+                <a:cs typeface="+mn-cs"/>
+              </a:defRPr>
+            </a:lvl6pPr>
+            <a:lvl7pPr marL="2743200" algn="l" defTabSz="914400" rtl="0" eaLnBrk="1" latinLnBrk="1" hangingPunct="1">
+              <a:defRPr sz="1800" kern="1200">
+                <a:solidFill>
+                  <a:schemeClr val="tx1"/>
+                </a:solidFill>
+                <a:latin typeface="+mn-lt"/>
+                <a:ea typeface="+mn-ea"/>
+                <a:cs typeface="+mn-cs"/>
+              </a:defRPr>
+            </a:lvl7pPr>
+            <a:lvl8pPr marL="3200400" algn="l" defTabSz="914400" rtl="0" eaLnBrk="1" latinLnBrk="1" hangingPunct="1">
+              <a:defRPr sz="1800" kern="1200">
+                <a:solidFill>
+                  <a:schemeClr val="tx1"/>
+                </a:solidFill>
+                <a:latin typeface="+mn-lt"/>
+                <a:ea typeface="+mn-ea"/>
+                <a:cs typeface="+mn-cs"/>
+              </a:defRPr>
+            </a:lvl8pPr>
+            <a:lvl9pPr marL="3657600" algn="l" defTabSz="914400" rtl="0" eaLnBrk="1" latinLnBrk="1" hangingPunct="1">
+              <a:defRPr sz="1800" kern="1200">
+                <a:solidFill>
+                  <a:schemeClr val="tx1"/>
+                </a:solidFill>
+                <a:latin typeface="+mn-lt"/>
+                <a:ea typeface="+mn-ea"/>
+                <a:cs typeface="+mn-cs"/>
+              </a:defRPr>
+            </a:lvl9pPr>
+          </a:lstStyle>
+          <a:p>
+            <a:pPr algn="ctr"/>
+            <a:r>
+              <a:rPr lang="en-US" altLang="ko-KR" dirty="0"/>
+              <a:t>A</a:t>
+            </a:r>
+            <a:r>
+              <a:rPr lang="ko-KR" altLang="en-US" dirty="0"/>
+              <a:t>컴퓨터 로컬 </a:t>
+            </a:r>
+            <a:r>
+              <a:rPr lang="ko-KR" altLang="en-US" dirty="0" err="1"/>
+              <a:t>레파지토리에서</a:t>
+            </a:r>
+            <a:r>
+              <a:rPr lang="ko-KR" altLang="en-US" dirty="0"/>
               <a:t> </a:t>
             </a:r>
             <a:r>
-              <a:rPr lang="en-US" altLang="ko-KR" b="0" i="0" dirty="0">
-                <a:solidFill>
-                  <a:srgbClr val="222222"/>
-                </a:solidFill>
-                <a:effectLst/>
-                <a:latin typeface="Noto Sans Medium"/>
-              </a:rPr>
-              <a:t>&lt;https://velog.io/@njs04210/Git-reset</a:t>
-            </a:r>
-            <a:r>
-              <a:rPr lang="ko-KR" altLang="en-US" b="0" i="0" dirty="0">
-                <a:solidFill>
-                  <a:srgbClr val="222222"/>
-                </a:solidFill>
-                <a:effectLst/>
-                <a:latin typeface="Noto Sans Medium"/>
-              </a:rPr>
-              <a:t>과</a:t>
-            </a:r>
-            <a:r>
-              <a:rPr lang="en-US" altLang="ko-KR" b="0" i="0" dirty="0">
-                <a:solidFill>
-                  <a:srgbClr val="222222"/>
-                </a:solidFill>
-                <a:effectLst/>
-                <a:latin typeface="Noto Sans Medium"/>
-              </a:rPr>
-              <a:t>-revert-</a:t>
-            </a:r>
-            <a:r>
-              <a:rPr lang="ko-KR" altLang="en-US" b="0" i="0" dirty="0">
-                <a:solidFill>
-                  <a:srgbClr val="222222"/>
-                </a:solidFill>
-                <a:effectLst/>
-                <a:latin typeface="Noto Sans Medium"/>
-              </a:rPr>
-              <a:t>알고</a:t>
-            </a:r>
-            <a:r>
-              <a:rPr lang="en-US" altLang="ko-KR" b="0" i="0" dirty="0">
-                <a:solidFill>
-                  <a:srgbClr val="222222"/>
-                </a:solidFill>
-                <a:effectLst/>
-                <a:latin typeface="Noto Sans Medium"/>
-              </a:rPr>
-              <a:t>-</a:t>
-            </a:r>
-            <a:r>
-              <a:rPr lang="ko-KR" altLang="en-US" b="0" i="0" dirty="0">
-                <a:solidFill>
-                  <a:srgbClr val="222222"/>
-                </a:solidFill>
-                <a:effectLst/>
-                <a:latin typeface="Noto Sans Medium"/>
-              </a:rPr>
-              <a:t>사용하기 </a:t>
-            </a:r>
-            <a:r>
-              <a:rPr lang="en-US" altLang="ko-KR" b="0" i="0" dirty="0">
-                <a:solidFill>
-                  <a:srgbClr val="222222"/>
-                </a:solidFill>
-                <a:effectLst/>
-                <a:latin typeface="Noto Sans Medium"/>
-              </a:rPr>
-              <a:t>&gt;.</a:t>
-            </a:r>
-            <a:endParaRPr lang="ko-KR" altLang="en-US" b="0" i="0" dirty="0">
-              <a:solidFill>
-                <a:srgbClr val="222222"/>
-              </a:solidFill>
-              <a:effectLst/>
-              <a:latin typeface="Noto Sans Medium"/>
-            </a:endParaRPr>
-          </a:p>
-        </p:txBody>
-      </p:sp>
-      <p:sp>
-        <p:nvSpPr>
-          <p:cNvPr id="3" name="TextBox 2">
-            <a:extLst>
-              <a:ext uri="{FF2B5EF4-FFF2-40B4-BE49-F238E27FC236}">
-                <a16:creationId xmlns:a16="http://schemas.microsoft.com/office/drawing/2014/main" id="{EE5B0F74-71D4-B2A2-0C83-E51B834C234F}"/>
-              </a:ext>
-            </a:extLst>
-          </p:cNvPr>
-          <p:cNvSpPr txBox="1"/>
-          <p:nvPr/>
-        </p:nvSpPr>
-        <p:spPr>
-          <a:xfrm>
-            <a:off x="243444" y="2673680"/>
-            <a:ext cx="9556334" cy="369332"/>
+              <a:rPr lang="en-US" altLang="ko-KR" dirty="0"/>
+              <a:t>“Merge</a:t>
+            </a:r>
+            <a:r>
+              <a:rPr lang="ko-KR" altLang="en-US" dirty="0"/>
+              <a:t> </a:t>
+            </a:r>
+            <a:r>
+              <a:rPr lang="en-US" altLang="ko-KR" dirty="0"/>
+              <a:t>branch</a:t>
+            </a:r>
+            <a:r>
+              <a:rPr lang="ko-KR" altLang="en-US" dirty="0"/>
+              <a:t> </a:t>
+            </a:r>
+            <a:r>
+              <a:rPr lang="en-US" altLang="ko-KR" dirty="0"/>
+              <a:t>‘</a:t>
+            </a:r>
+            <a:r>
+              <a:rPr lang="en-US" altLang="ko-KR" dirty="0" err="1"/>
+              <a:t>daniel</a:t>
+            </a:r>
+            <a:r>
+              <a:rPr lang="en-US" altLang="ko-KR" dirty="0"/>
+              <a:t>’” commit</a:t>
+            </a:r>
+            <a:r>
+              <a:rPr lang="ko-KR" altLang="en-US" dirty="0"/>
+              <a:t>까지 </a:t>
+            </a:r>
+            <a:r>
+              <a:rPr lang="en-US" altLang="ko-KR" dirty="0"/>
+              <a:t>reset</a:t>
+            </a:r>
+            <a:r>
+              <a:rPr lang="ko-KR" altLang="en-US" dirty="0"/>
+              <a:t>한다</a:t>
+            </a:r>
+            <a:r>
+              <a:rPr lang="en-US" altLang="ko-KR" dirty="0"/>
+              <a:t>.</a:t>
+            </a:r>
+          </a:p>
+          <a:p>
+            <a:pPr algn="ctr"/>
+            <a:r>
+              <a:rPr lang="en-US" altLang="ko-KR" dirty="0"/>
+              <a:t>reset</a:t>
+            </a:r>
+            <a:r>
+              <a:rPr lang="ko-KR" altLang="en-US" dirty="0"/>
+              <a:t>이 완료되면 원격 저장소의 </a:t>
+            </a:r>
+            <a:r>
+              <a:rPr lang="en-US" altLang="ko-KR" dirty="0" err="1"/>
+              <a:t>reset_test</a:t>
+            </a:r>
+            <a:r>
+              <a:rPr lang="ko-KR" altLang="en-US" dirty="0" err="1"/>
+              <a:t>브랜치와</a:t>
+            </a:r>
+            <a:r>
+              <a:rPr lang="ko-KR" altLang="en-US" dirty="0"/>
+              <a:t> </a:t>
+            </a:r>
+            <a:r>
+              <a:rPr lang="en-US" altLang="ko-KR" dirty="0"/>
+              <a:t>3</a:t>
+            </a:r>
+            <a:r>
+              <a:rPr lang="ko-KR" altLang="en-US" dirty="0"/>
+              <a:t>개의 </a:t>
+            </a:r>
+            <a:r>
+              <a:rPr lang="en-US" altLang="ko-KR" dirty="0"/>
+              <a:t>commit </a:t>
+            </a:r>
+            <a:r>
+              <a:rPr lang="ko-KR" altLang="en-US" dirty="0"/>
+              <a:t>차이가 발생한다</a:t>
+            </a:r>
+            <a:r>
+              <a:rPr lang="en-US" altLang="ko-KR" dirty="0"/>
+              <a:t>.</a:t>
+            </a:r>
+          </a:p>
+        </p:txBody>
+      </p:sp>
+      <p:pic>
+        <p:nvPicPr>
+          <p:cNvPr id="5" name="그림 4">
+            <a:extLst>
+              <a:ext uri="{FF2B5EF4-FFF2-40B4-BE49-F238E27FC236}">
+                <a16:creationId xmlns:a16="http://schemas.microsoft.com/office/drawing/2014/main" id="{07BD55F0-4EB5-EA76-5A78-EEC5E615F3B9}"/>
+              </a:ext>
+            </a:extLst>
+          </p:cNvPr>
+          <p:cNvPicPr>
+            <a:picLocks noChangeAspect="1"/>
+          </p:cNvPicPr>
+          <p:nvPr/>
+        </p:nvPicPr>
+        <p:blipFill>
+          <a:blip r:embed="rId2"/>
+          <a:stretch>
+            <a:fillRect/>
+          </a:stretch>
+        </p:blipFill>
+        <p:spPr>
+          <a:xfrm>
+            <a:off x="2057905" y="2014714"/>
+            <a:ext cx="8076190" cy="2828571"/>
           </a:xfrm>
           <a:prstGeom prst="rect">
             <a:avLst/>
           </a:prstGeom>
-          <a:noFill/>
-        </p:spPr>
-        <p:txBody>
-          <a:bodyPr wrap="none" rtlCol="0">
-            <a:spAutoFit/>
-          </a:bodyPr>
-          <a:lstStyle/>
-          <a:p>
-            <a:r>
-              <a:rPr lang="ko-KR" altLang="en-US" dirty="0" err="1">
-                <a:solidFill>
-                  <a:srgbClr val="222222"/>
-                </a:solidFill>
-                <a:latin typeface="Noto Sans Medium"/>
-              </a:rPr>
-              <a:t>무사덤벨레</a:t>
-            </a:r>
-            <a:r>
-              <a:rPr lang="en-US" altLang="ko-KR" dirty="0">
-                <a:solidFill>
-                  <a:srgbClr val="222222"/>
-                </a:solidFill>
-                <a:latin typeface="Noto Sans Medium"/>
-              </a:rPr>
-              <a:t>, </a:t>
-            </a:r>
-            <a:r>
-              <a:rPr lang="en-US" altLang="ko-KR" b="0" i="0" dirty="0">
-                <a:solidFill>
-                  <a:srgbClr val="222222"/>
-                </a:solidFill>
-                <a:effectLst/>
-                <a:latin typeface="Noto Sans Medium"/>
-              </a:rPr>
-              <a:t>“[Git] reset</a:t>
-            </a:r>
-            <a:r>
-              <a:rPr lang="ko-KR" altLang="en-US" b="0" i="0" dirty="0">
-                <a:solidFill>
-                  <a:srgbClr val="222222"/>
-                </a:solidFill>
-                <a:effectLst/>
-                <a:latin typeface="Noto Sans Medium"/>
-              </a:rPr>
-              <a:t>과 </a:t>
-            </a:r>
-            <a:r>
-              <a:rPr lang="en-US" altLang="ko-KR" b="0" i="0" dirty="0">
-                <a:solidFill>
-                  <a:srgbClr val="222222"/>
-                </a:solidFill>
-                <a:effectLst/>
-                <a:latin typeface="Noto Sans Medium"/>
-              </a:rPr>
-              <a:t>git revert”, </a:t>
-            </a:r>
-            <a:r>
-              <a:rPr lang="ko-KR" altLang="en-US" b="0" i="0" dirty="0">
-                <a:solidFill>
-                  <a:srgbClr val="222222"/>
-                </a:solidFill>
-                <a:effectLst/>
-                <a:latin typeface="Noto Sans Medium"/>
-              </a:rPr>
-              <a:t>티스토리</a:t>
-            </a:r>
-            <a:r>
-              <a:rPr lang="en-US" altLang="ko-KR" b="0" i="0" dirty="0">
-                <a:solidFill>
-                  <a:srgbClr val="222222"/>
-                </a:solidFill>
-                <a:effectLst/>
-                <a:latin typeface="Noto Sans Medium"/>
-              </a:rPr>
-              <a:t>, 2022.02.18., &lt;</a:t>
-            </a:r>
-            <a:r>
-              <a:rPr lang="en-US" altLang="ko-KR" dirty="0">
-                <a:latin typeface="NotoSansKR"/>
-              </a:rPr>
-              <a:t> </a:t>
-            </a:r>
-            <a:r>
-              <a:rPr lang="en-US" altLang="ko-KR" b="0" i="0" u="none" strike="noStrike" dirty="0">
-                <a:effectLst/>
-                <a:latin typeface="NotoSansKR"/>
-              </a:rPr>
-              <a:t>https://hajoung56.tistory.com/31 </a:t>
-            </a:r>
-            <a:r>
-              <a:rPr lang="en-US" altLang="ko-KR" b="0" i="0" dirty="0">
-                <a:solidFill>
-                  <a:srgbClr val="222222"/>
-                </a:solidFill>
-                <a:effectLst/>
-                <a:latin typeface="Noto Sans Medium"/>
-              </a:rPr>
-              <a:t>&gt;.</a:t>
-            </a:r>
-            <a:endParaRPr lang="ko-KR" altLang="en-US" b="0" i="0" dirty="0">
-              <a:solidFill>
-                <a:srgbClr val="222222"/>
-              </a:solidFill>
-              <a:effectLst/>
-              <a:latin typeface="Noto Sans Medium"/>
-            </a:endParaRPr>
-          </a:p>
-        </p:txBody>
-      </p:sp>
-      <p:sp>
-        <p:nvSpPr>
-          <p:cNvPr id="5" name="TextBox 4">
-            <a:extLst>
-              <a:ext uri="{FF2B5EF4-FFF2-40B4-BE49-F238E27FC236}">
-                <a16:creationId xmlns:a16="http://schemas.microsoft.com/office/drawing/2014/main" id="{D4F74F21-2C2D-617F-744F-BAE063E340C5}"/>
-              </a:ext>
-            </a:extLst>
-          </p:cNvPr>
-          <p:cNvSpPr txBox="1"/>
-          <p:nvPr/>
-        </p:nvSpPr>
-        <p:spPr>
-          <a:xfrm>
-            <a:off x="243444" y="3417191"/>
-            <a:ext cx="7359964" cy="646331"/>
-          </a:xfrm>
-          <a:prstGeom prst="rect">
-            <a:avLst/>
-          </a:prstGeom>
-          <a:noFill/>
-        </p:spPr>
-        <p:txBody>
-          <a:bodyPr wrap="none" rtlCol="0">
-            <a:spAutoFit/>
-          </a:bodyPr>
-          <a:lstStyle/>
-          <a:p>
-            <a:r>
-              <a:rPr lang="ko-KR" altLang="en-US" dirty="0">
-                <a:solidFill>
-                  <a:srgbClr val="222222"/>
-                </a:solidFill>
-                <a:latin typeface="Noto Sans Medium"/>
-              </a:rPr>
-              <a:t>막무가내막내</a:t>
-            </a:r>
-            <a:r>
-              <a:rPr lang="en-US" altLang="ko-KR" dirty="0">
-                <a:solidFill>
-                  <a:srgbClr val="222222"/>
-                </a:solidFill>
-                <a:latin typeface="Noto Sans Medium"/>
-              </a:rPr>
-              <a:t>, </a:t>
-            </a:r>
-            <a:r>
-              <a:rPr lang="en-US" altLang="ko-KR" b="0" i="0" dirty="0">
-                <a:solidFill>
-                  <a:srgbClr val="222222"/>
-                </a:solidFill>
-                <a:effectLst/>
-                <a:latin typeface="Noto Sans Medium"/>
-              </a:rPr>
-              <a:t>“[Git] Reset, Revert </a:t>
-            </a:r>
-            <a:r>
-              <a:rPr lang="ko-KR" altLang="en-US" b="0" i="0" dirty="0">
-                <a:solidFill>
-                  <a:srgbClr val="222222"/>
-                </a:solidFill>
-                <a:effectLst/>
-                <a:latin typeface="Noto Sans Medium"/>
-              </a:rPr>
-              <a:t>차이 간략정리</a:t>
-            </a:r>
-            <a:r>
-              <a:rPr lang="en-US" altLang="ko-KR" b="0" i="0" dirty="0">
-                <a:solidFill>
-                  <a:srgbClr val="222222"/>
-                </a:solidFill>
-                <a:effectLst/>
-                <a:latin typeface="Noto Sans Medium"/>
-              </a:rPr>
-              <a:t>”, </a:t>
-            </a:r>
-            <a:r>
-              <a:rPr lang="ko-KR" altLang="en-US" b="0" i="0" dirty="0">
-                <a:solidFill>
-                  <a:srgbClr val="222222"/>
-                </a:solidFill>
-                <a:effectLst/>
-                <a:latin typeface="Noto Sans Medium"/>
-              </a:rPr>
-              <a:t>티스토리</a:t>
-            </a:r>
-            <a:r>
-              <a:rPr lang="en-US" altLang="ko-KR" b="0" i="0" dirty="0">
-                <a:solidFill>
-                  <a:srgbClr val="222222"/>
-                </a:solidFill>
-                <a:effectLst/>
-                <a:latin typeface="Noto Sans Medium"/>
-              </a:rPr>
-              <a:t>, 2020.03.20.,</a:t>
-            </a:r>
-          </a:p>
-          <a:p>
-            <a:r>
-              <a:rPr lang="en-US" altLang="ko-KR" b="0" i="0" dirty="0">
-                <a:solidFill>
-                  <a:srgbClr val="222222"/>
-                </a:solidFill>
-                <a:effectLst/>
-                <a:latin typeface="Noto Sans Medium"/>
-              </a:rPr>
-              <a:t>&lt;</a:t>
-            </a:r>
-            <a:r>
-              <a:rPr lang="en-US" altLang="ko-KR" dirty="0">
-                <a:latin typeface="NotoSansKR"/>
-              </a:rPr>
-              <a:t> </a:t>
-            </a:r>
-            <a:r>
-              <a:rPr lang="en-US" altLang="ko-KR" b="0" i="0" u="none" strike="noStrike" dirty="0">
-                <a:effectLst/>
-                <a:latin typeface="NotoSansKR"/>
-              </a:rPr>
-              <a:t>https://youngest-programming.tistory.com/220 </a:t>
-            </a:r>
-            <a:r>
-              <a:rPr lang="en-US" altLang="ko-KR" b="0" i="0" dirty="0">
-                <a:solidFill>
-                  <a:srgbClr val="222222"/>
-                </a:solidFill>
-                <a:effectLst/>
-                <a:latin typeface="Noto Sans Medium"/>
-              </a:rPr>
-              <a:t>&gt;.</a:t>
-            </a:r>
-            <a:endParaRPr lang="ko-KR" altLang="en-US" b="0" i="0" dirty="0">
-              <a:solidFill>
-                <a:srgbClr val="222222"/>
-              </a:solidFill>
-              <a:effectLst/>
-              <a:latin typeface="Noto Sans Medium"/>
-            </a:endParaRPr>
-          </a:p>
-        </p:txBody>
-      </p:sp>
-      <p:sp>
-        <p:nvSpPr>
-          <p:cNvPr id="6" name="TextBox 5">
-            <a:extLst>
-              <a:ext uri="{FF2B5EF4-FFF2-40B4-BE49-F238E27FC236}">
-                <a16:creationId xmlns:a16="http://schemas.microsoft.com/office/drawing/2014/main" id="{C7033CA0-2A7A-8560-ADA7-766024368518}"/>
-              </a:ext>
-            </a:extLst>
-          </p:cNvPr>
-          <p:cNvSpPr txBox="1"/>
-          <p:nvPr/>
-        </p:nvSpPr>
-        <p:spPr>
-          <a:xfrm>
-            <a:off x="243444" y="4437701"/>
-            <a:ext cx="10911833" cy="369332"/>
-          </a:xfrm>
-          <a:prstGeom prst="rect">
-            <a:avLst/>
-          </a:prstGeom>
-          <a:noFill/>
-        </p:spPr>
-        <p:txBody>
-          <a:bodyPr wrap="none" rtlCol="0">
-            <a:spAutoFit/>
-          </a:bodyPr>
-          <a:lstStyle/>
-          <a:p>
-            <a:r>
-              <a:rPr lang="en-US" altLang="ko-KR" b="0" i="0" dirty="0">
-                <a:solidFill>
-                  <a:srgbClr val="222222"/>
-                </a:solidFill>
-                <a:effectLst/>
-                <a:latin typeface="Noto Sans Medium"/>
-              </a:rPr>
-              <a:t>“7.7 Git </a:t>
-            </a:r>
-            <a:r>
-              <a:rPr lang="ko-KR" altLang="en-US" b="0" i="0" dirty="0">
-                <a:solidFill>
-                  <a:srgbClr val="222222"/>
-                </a:solidFill>
-                <a:effectLst/>
-                <a:latin typeface="Noto Sans Medium"/>
-              </a:rPr>
-              <a:t>도구 </a:t>
-            </a:r>
-            <a:r>
-              <a:rPr lang="en-US" altLang="ko-KR" b="0" i="0" dirty="0">
-                <a:solidFill>
-                  <a:srgbClr val="222222"/>
-                </a:solidFill>
-                <a:effectLst/>
-                <a:latin typeface="Noto Sans Medium"/>
-              </a:rPr>
-              <a:t>– Reset </a:t>
-            </a:r>
-            <a:r>
-              <a:rPr lang="ko-KR" altLang="en-US" b="0" i="0" dirty="0">
-                <a:solidFill>
-                  <a:srgbClr val="222222"/>
-                </a:solidFill>
-                <a:effectLst/>
-                <a:latin typeface="Noto Sans Medium"/>
-              </a:rPr>
-              <a:t>명확히 알고 가기</a:t>
-            </a:r>
-            <a:r>
-              <a:rPr lang="en-US" altLang="ko-KR" b="0" i="0" dirty="0">
-                <a:solidFill>
-                  <a:srgbClr val="222222"/>
-                </a:solidFill>
-                <a:effectLst/>
-                <a:latin typeface="Noto Sans Medium"/>
-              </a:rPr>
-              <a:t>”, </a:t>
-            </a:r>
-            <a:r>
-              <a:rPr lang="en-US" altLang="ko-KR" dirty="0">
-                <a:solidFill>
-                  <a:srgbClr val="222222"/>
-                </a:solidFill>
-                <a:latin typeface="Noto Sans Medium"/>
-              </a:rPr>
-              <a:t> </a:t>
-            </a:r>
-            <a:r>
-              <a:rPr lang="en-US" altLang="ko-KR" b="0" i="0" dirty="0">
-                <a:solidFill>
-                  <a:srgbClr val="222222"/>
-                </a:solidFill>
-                <a:effectLst/>
-                <a:latin typeface="Noto Sans Medium"/>
-              </a:rPr>
-              <a:t>&lt;</a:t>
-            </a:r>
-            <a:r>
-              <a:rPr lang="en-US" altLang="ko-KR" b="0" i="0" u="none" strike="noStrike" dirty="0">
-                <a:effectLst/>
-                <a:latin typeface="NotoSansKR"/>
-                <a:hlinkClick r:id="rId2"/>
-              </a:rPr>
-              <a:t> </a:t>
-            </a:r>
-            <a:r>
-              <a:rPr lang="en-US" altLang="ko-KR" b="0" i="0" dirty="0">
-                <a:solidFill>
-                  <a:srgbClr val="222222"/>
-                </a:solidFill>
-                <a:effectLst/>
-                <a:latin typeface="Noto Sans Medium"/>
-              </a:rPr>
-              <a:t>https://git-scm.com/book/ko/v2/Git-</a:t>
-            </a:r>
-            <a:r>
-              <a:rPr lang="ko-KR" altLang="en-US" b="0" i="0" dirty="0">
-                <a:solidFill>
-                  <a:srgbClr val="222222"/>
-                </a:solidFill>
-                <a:effectLst/>
-                <a:latin typeface="Noto Sans Medium"/>
-              </a:rPr>
-              <a:t>도구</a:t>
-            </a:r>
-            <a:r>
-              <a:rPr lang="en-US" altLang="ko-KR" b="0" i="0" dirty="0">
-                <a:solidFill>
-                  <a:srgbClr val="222222"/>
-                </a:solidFill>
-                <a:effectLst/>
-                <a:latin typeface="Noto Sans Medium"/>
-              </a:rPr>
-              <a:t>-Reset-</a:t>
-            </a:r>
-            <a:r>
-              <a:rPr lang="ko-KR" altLang="en-US" b="0" i="0" dirty="0">
-                <a:solidFill>
-                  <a:srgbClr val="222222"/>
-                </a:solidFill>
-                <a:effectLst/>
-                <a:latin typeface="Noto Sans Medium"/>
-              </a:rPr>
-              <a:t>명확히</a:t>
-            </a:r>
-            <a:r>
-              <a:rPr lang="en-US" altLang="ko-KR" b="0" i="0" dirty="0">
-                <a:solidFill>
-                  <a:srgbClr val="222222"/>
-                </a:solidFill>
-                <a:effectLst/>
-                <a:latin typeface="Noto Sans Medium"/>
-              </a:rPr>
-              <a:t>-</a:t>
-            </a:r>
-            <a:r>
-              <a:rPr lang="ko-KR" altLang="en-US" b="0" i="0" dirty="0">
-                <a:solidFill>
-                  <a:srgbClr val="222222"/>
-                </a:solidFill>
-                <a:effectLst/>
-                <a:latin typeface="Noto Sans Medium"/>
-              </a:rPr>
-              <a:t>알고</a:t>
-            </a:r>
-            <a:r>
-              <a:rPr lang="en-US" altLang="ko-KR" b="0" i="0" dirty="0">
-                <a:solidFill>
-                  <a:srgbClr val="222222"/>
-                </a:solidFill>
-                <a:effectLst/>
-                <a:latin typeface="Noto Sans Medium"/>
-              </a:rPr>
-              <a:t>-</a:t>
-            </a:r>
-            <a:r>
-              <a:rPr lang="ko-KR" altLang="en-US" b="0" i="0" dirty="0">
-                <a:solidFill>
-                  <a:srgbClr val="222222"/>
-                </a:solidFill>
-                <a:effectLst/>
-                <a:latin typeface="Noto Sans Medium"/>
-              </a:rPr>
-              <a:t>가기 </a:t>
-            </a:r>
-            <a:r>
-              <a:rPr lang="en-US" altLang="ko-KR" b="0" i="0" dirty="0">
-                <a:solidFill>
-                  <a:srgbClr val="222222"/>
-                </a:solidFill>
-                <a:effectLst/>
-                <a:latin typeface="Noto Sans Medium"/>
-              </a:rPr>
-              <a:t>&gt;.</a:t>
-            </a:r>
-            <a:endParaRPr lang="ko-KR" altLang="en-US" b="0" i="0" dirty="0">
-              <a:solidFill>
-                <a:srgbClr val="222222"/>
-              </a:solidFill>
-              <a:effectLst/>
-              <a:latin typeface="Noto Sans Medium"/>
-            </a:endParaRPr>
-          </a:p>
-        </p:txBody>
-      </p:sp>
-      <p:sp>
-        <p:nvSpPr>
-          <p:cNvPr id="7" name="TextBox 6">
-            <a:extLst>
-              <a:ext uri="{FF2B5EF4-FFF2-40B4-BE49-F238E27FC236}">
-                <a16:creationId xmlns:a16="http://schemas.microsoft.com/office/drawing/2014/main" id="{8D8AEAE8-95BC-CA53-5298-DAAD31E42F85}"/>
-              </a:ext>
-            </a:extLst>
-          </p:cNvPr>
-          <p:cNvSpPr txBox="1"/>
-          <p:nvPr/>
-        </p:nvSpPr>
-        <p:spPr>
-          <a:xfrm>
-            <a:off x="243444" y="5181212"/>
-            <a:ext cx="9208996" cy="646331"/>
-          </a:xfrm>
-          <a:prstGeom prst="rect">
-            <a:avLst/>
-          </a:prstGeom>
-          <a:noFill/>
-        </p:spPr>
-        <p:txBody>
-          <a:bodyPr wrap="none" rtlCol="0">
-            <a:spAutoFit/>
-          </a:bodyPr>
-          <a:lstStyle/>
-          <a:p>
-            <a:r>
-              <a:rPr lang="ko-KR" altLang="en-US" dirty="0">
-                <a:solidFill>
-                  <a:srgbClr val="222222"/>
-                </a:solidFill>
-                <a:latin typeface="Noto Sans Medium"/>
-              </a:rPr>
-              <a:t>컴퓨터 탐험가 찰리</a:t>
-            </a:r>
-            <a:r>
-              <a:rPr lang="en-US" altLang="ko-KR" dirty="0">
-                <a:solidFill>
-                  <a:srgbClr val="222222"/>
-                </a:solidFill>
-                <a:latin typeface="Noto Sans Medium"/>
-              </a:rPr>
-              <a:t>, </a:t>
-            </a:r>
-            <a:r>
-              <a:rPr lang="en-US" altLang="ko-KR" b="0" i="0" dirty="0">
-                <a:solidFill>
-                  <a:srgbClr val="222222"/>
-                </a:solidFill>
-                <a:effectLst/>
-                <a:latin typeface="Noto Sans Medium"/>
-              </a:rPr>
-              <a:t>“Git Commit </a:t>
-            </a:r>
-            <a:r>
-              <a:rPr lang="ko-KR" altLang="en-US" b="0" i="0" dirty="0">
-                <a:solidFill>
-                  <a:srgbClr val="222222"/>
-                </a:solidFill>
-                <a:effectLst/>
-                <a:latin typeface="Noto Sans Medium"/>
-              </a:rPr>
-              <a:t>취소 </a:t>
-            </a:r>
-            <a:r>
-              <a:rPr lang="en-US" altLang="ko-KR" b="0" i="0" dirty="0">
-                <a:solidFill>
-                  <a:srgbClr val="222222"/>
-                </a:solidFill>
-                <a:effectLst/>
-                <a:latin typeface="Noto Sans Medium"/>
-              </a:rPr>
-              <a:t>: Reset, Revert </a:t>
-            </a:r>
-            <a:r>
-              <a:rPr lang="ko-KR" altLang="en-US" b="0" i="0" dirty="0">
-                <a:solidFill>
-                  <a:srgbClr val="222222"/>
-                </a:solidFill>
-                <a:effectLst/>
-                <a:latin typeface="Noto Sans Medium"/>
-              </a:rPr>
-              <a:t>개념 이해하기</a:t>
-            </a:r>
-            <a:r>
-              <a:rPr lang="en-US" altLang="ko-KR" b="0" i="0" dirty="0">
-                <a:solidFill>
-                  <a:srgbClr val="222222"/>
-                </a:solidFill>
-                <a:effectLst/>
-                <a:latin typeface="Noto Sans Medium"/>
-              </a:rPr>
-              <a:t>”, </a:t>
-            </a:r>
-            <a:r>
-              <a:rPr lang="ko-KR" altLang="en-US" b="0" i="0" dirty="0">
-                <a:solidFill>
-                  <a:srgbClr val="222222"/>
-                </a:solidFill>
-                <a:effectLst/>
-                <a:latin typeface="Noto Sans Medium"/>
-              </a:rPr>
-              <a:t>티스토리</a:t>
-            </a:r>
-            <a:r>
-              <a:rPr lang="en-US" altLang="ko-KR" b="0" i="0" dirty="0">
-                <a:solidFill>
-                  <a:srgbClr val="222222"/>
-                </a:solidFill>
-                <a:effectLst/>
-                <a:latin typeface="Noto Sans Medium"/>
-              </a:rPr>
-              <a:t>, 2022.07.30.,</a:t>
-            </a:r>
-          </a:p>
-          <a:p>
-            <a:r>
-              <a:rPr lang="en-US" altLang="ko-KR" b="0" i="0" dirty="0">
-                <a:solidFill>
-                  <a:srgbClr val="222222"/>
-                </a:solidFill>
-                <a:effectLst/>
-                <a:latin typeface="Noto Sans Medium"/>
-              </a:rPr>
-              <a:t>&lt;</a:t>
-            </a:r>
-            <a:r>
-              <a:rPr lang="en-US" altLang="ko-KR" dirty="0">
-                <a:latin typeface="NotoSansKR"/>
-              </a:rPr>
-              <a:t> </a:t>
-            </a:r>
-            <a:r>
-              <a:rPr lang="en-US" altLang="ko-KR" b="0" i="0" u="none" strike="noStrike" dirty="0">
-                <a:effectLst/>
-                <a:latin typeface="NotoSansKR"/>
-              </a:rPr>
-              <a:t>https://whitepro.tistory.com/646 </a:t>
-            </a:r>
-            <a:r>
-              <a:rPr lang="en-US" altLang="ko-KR" b="0" i="0" dirty="0">
-                <a:solidFill>
-                  <a:srgbClr val="222222"/>
-                </a:solidFill>
-                <a:effectLst/>
-                <a:latin typeface="Noto Sans Medium"/>
-              </a:rPr>
-              <a:t>&gt;.</a:t>
-            </a:r>
-            <a:endParaRPr lang="ko-KR" altLang="en-US" b="0" i="0" dirty="0">
-              <a:solidFill>
-                <a:srgbClr val="222222"/>
-              </a:solidFill>
-              <a:effectLst/>
-              <a:latin typeface="Noto Sans Medium"/>
-            </a:endParaRPr>
-          </a:p>
-        </p:txBody>
-      </p:sp>
+        </p:spPr>
+      </p:pic>
     </p:spTree>
     <p:extLst>
       <p:ext uri="{BB962C8B-B14F-4D97-AF65-F5344CB8AC3E}">
-        <p14:creationId xmlns:p14="http://schemas.microsoft.com/office/powerpoint/2010/main" val="374911859"/>
+        <p14:creationId xmlns:p14="http://schemas.microsoft.com/office/powerpoint/2010/main" val="636571146"/>
       </p:ext>
     </p:extLst>
   </p:cSld>
@@ -33081,10 +32598,10 @@
       </p:grpSpPr>
       <p:sp>
         <p:nvSpPr>
-          <p:cNvPr id="4" name="TextBox 3">
-            <a:extLst>
-              <a:ext uri="{FF2B5EF4-FFF2-40B4-BE49-F238E27FC236}">
-                <a16:creationId xmlns:a16="http://schemas.microsoft.com/office/drawing/2014/main" id="{B8452C05-1494-512C-6C90-1962FBF1EBCF}"/>
+          <p:cNvPr id="2" name="TextBox 1">
+            <a:extLst>
+              <a:ext uri="{FF2B5EF4-FFF2-40B4-BE49-F238E27FC236}">
+                <a16:creationId xmlns:a16="http://schemas.microsoft.com/office/drawing/2014/main" id="{8B9E4CAA-6677-0803-D0CB-1724DCCE63B4}"/>
               </a:ext>
             </a:extLst>
           </p:cNvPr>
@@ -33093,8 +32610,8 @@
         </p:nvSpPr>
         <p:spPr>
           <a:xfrm>
-            <a:off x="5256123" y="2967335"/>
-            <a:ext cx="1679755" cy="923330"/>
+            <a:off x="5057915" y="253628"/>
+            <a:ext cx="2076209" cy="584775"/>
           </a:xfrm>
           <a:prstGeom prst="rect">
             <a:avLst/>
@@ -33109,17 +32626,2039 @@
           <a:p>
             <a:pPr algn="ctr"/>
             <a:r>
-              <a:rPr lang="en-US" altLang="ko-KR" sz="5400" dirty="0"/>
-              <a:t>EOD.</a:t>
-            </a:r>
-            <a:endParaRPr lang="ko-KR" altLang="en-US" sz="5400" dirty="0"/>
-          </a:p>
-        </p:txBody>
-      </p:sp>
+              <a:rPr lang="en-US" altLang="ko-KR" sz="3200" dirty="0"/>
+              <a:t>[</a:t>
+            </a:r>
+            <a:r>
+              <a:rPr lang="ko-KR" altLang="en-US" sz="3200" dirty="0" err="1"/>
+              <a:t>상황재연</a:t>
+            </a:r>
+            <a:r>
+              <a:rPr lang="en-US" altLang="ko-KR" sz="3200" dirty="0"/>
+              <a:t>]</a:t>
+            </a:r>
+          </a:p>
+        </p:txBody>
+      </p:sp>
+      <p:sp>
+        <p:nvSpPr>
+          <p:cNvPr id="4" name="TextBox 2">
+            <a:extLst>
+              <a:ext uri="{FF2B5EF4-FFF2-40B4-BE49-F238E27FC236}">
+                <a16:creationId xmlns:a16="http://schemas.microsoft.com/office/drawing/2014/main" id="{1244FB8D-F7D1-60E7-72B4-8B2DA7253DAA}"/>
+              </a:ext>
+            </a:extLst>
+          </p:cNvPr>
+          <p:cNvSpPr txBox="1"/>
+          <p:nvPr/>
+        </p:nvSpPr>
+        <p:spPr>
+          <a:xfrm>
+            <a:off x="3769144" y="6124014"/>
+            <a:ext cx="4025461" cy="369332"/>
+          </a:xfrm>
+          <a:prstGeom prst="rect">
+            <a:avLst/>
+          </a:prstGeom>
+          <a:noFill/>
+        </p:spPr>
+        <p:txBody>
+          <a:bodyPr wrap="none" rtlCol="0">
+            <a:spAutoFit/>
+          </a:bodyPr>
+          <a:lstStyle>
+            <a:defPPr>
+              <a:defRPr lang="ko-KR"/>
+            </a:defPPr>
+            <a:lvl1pPr marL="0" algn="l" defTabSz="914400" rtl="0" eaLnBrk="1" latinLnBrk="1" hangingPunct="1">
+              <a:defRPr sz="1800" kern="1200">
+                <a:solidFill>
+                  <a:schemeClr val="tx1"/>
+                </a:solidFill>
+                <a:latin typeface="+mn-lt"/>
+                <a:ea typeface="+mn-ea"/>
+                <a:cs typeface="+mn-cs"/>
+              </a:defRPr>
+            </a:lvl1pPr>
+            <a:lvl2pPr marL="457200" algn="l" defTabSz="914400" rtl="0" eaLnBrk="1" latinLnBrk="1" hangingPunct="1">
+              <a:defRPr sz="1800" kern="1200">
+                <a:solidFill>
+                  <a:schemeClr val="tx1"/>
+                </a:solidFill>
+                <a:latin typeface="+mn-lt"/>
+                <a:ea typeface="+mn-ea"/>
+                <a:cs typeface="+mn-cs"/>
+              </a:defRPr>
+            </a:lvl2pPr>
+            <a:lvl3pPr marL="914400" algn="l" defTabSz="914400" rtl="0" eaLnBrk="1" latinLnBrk="1" hangingPunct="1">
+              <a:defRPr sz="1800" kern="1200">
+                <a:solidFill>
+                  <a:schemeClr val="tx1"/>
+                </a:solidFill>
+                <a:latin typeface="+mn-lt"/>
+                <a:ea typeface="+mn-ea"/>
+                <a:cs typeface="+mn-cs"/>
+              </a:defRPr>
+            </a:lvl3pPr>
+            <a:lvl4pPr marL="1371600" algn="l" defTabSz="914400" rtl="0" eaLnBrk="1" latinLnBrk="1" hangingPunct="1">
+              <a:defRPr sz="1800" kern="1200">
+                <a:solidFill>
+                  <a:schemeClr val="tx1"/>
+                </a:solidFill>
+                <a:latin typeface="+mn-lt"/>
+                <a:ea typeface="+mn-ea"/>
+                <a:cs typeface="+mn-cs"/>
+              </a:defRPr>
+            </a:lvl4pPr>
+            <a:lvl5pPr marL="1828800" algn="l" defTabSz="914400" rtl="0" eaLnBrk="1" latinLnBrk="1" hangingPunct="1">
+              <a:defRPr sz="1800" kern="1200">
+                <a:solidFill>
+                  <a:schemeClr val="tx1"/>
+                </a:solidFill>
+                <a:latin typeface="+mn-lt"/>
+                <a:ea typeface="+mn-ea"/>
+                <a:cs typeface="+mn-cs"/>
+              </a:defRPr>
+            </a:lvl5pPr>
+            <a:lvl6pPr marL="2286000" algn="l" defTabSz="914400" rtl="0" eaLnBrk="1" latinLnBrk="1" hangingPunct="1">
+              <a:defRPr sz="1800" kern="1200">
+                <a:solidFill>
+                  <a:schemeClr val="tx1"/>
+                </a:solidFill>
+                <a:latin typeface="+mn-lt"/>
+                <a:ea typeface="+mn-ea"/>
+                <a:cs typeface="+mn-cs"/>
+              </a:defRPr>
+            </a:lvl6pPr>
+            <a:lvl7pPr marL="2743200" algn="l" defTabSz="914400" rtl="0" eaLnBrk="1" latinLnBrk="1" hangingPunct="1">
+              <a:defRPr sz="1800" kern="1200">
+                <a:solidFill>
+                  <a:schemeClr val="tx1"/>
+                </a:solidFill>
+                <a:latin typeface="+mn-lt"/>
+                <a:ea typeface="+mn-ea"/>
+                <a:cs typeface="+mn-cs"/>
+              </a:defRPr>
+            </a:lvl7pPr>
+            <a:lvl8pPr marL="3200400" algn="l" defTabSz="914400" rtl="0" eaLnBrk="1" latinLnBrk="1" hangingPunct="1">
+              <a:defRPr sz="1800" kern="1200">
+                <a:solidFill>
+                  <a:schemeClr val="tx1"/>
+                </a:solidFill>
+                <a:latin typeface="+mn-lt"/>
+                <a:ea typeface="+mn-ea"/>
+                <a:cs typeface="+mn-cs"/>
+              </a:defRPr>
+            </a:lvl8pPr>
+            <a:lvl9pPr marL="3657600" algn="l" defTabSz="914400" rtl="0" eaLnBrk="1" latinLnBrk="1" hangingPunct="1">
+              <a:defRPr sz="1800" kern="1200">
+                <a:solidFill>
+                  <a:schemeClr val="tx1"/>
+                </a:solidFill>
+                <a:latin typeface="+mn-lt"/>
+                <a:ea typeface="+mn-ea"/>
+                <a:cs typeface="+mn-cs"/>
+              </a:defRPr>
+            </a:lvl9pPr>
+          </a:lstStyle>
+          <a:p>
+            <a:pPr algn="ctr"/>
+            <a:r>
+              <a:rPr lang="ko-KR" altLang="en-US" dirty="0"/>
+              <a:t>활성화된 강제 </a:t>
+            </a:r>
+            <a:r>
+              <a:rPr lang="ko-KR" altLang="en-US" dirty="0" err="1"/>
+              <a:t>푸시</a:t>
+            </a:r>
+            <a:r>
+              <a:rPr lang="ko-KR" altLang="en-US" dirty="0"/>
+              <a:t> 옵션을 체크한다</a:t>
+            </a:r>
+            <a:r>
+              <a:rPr lang="en-US" altLang="ko-KR" dirty="0"/>
+              <a:t>.</a:t>
+            </a:r>
+          </a:p>
+        </p:txBody>
+      </p:sp>
+      <p:pic>
+        <p:nvPicPr>
+          <p:cNvPr id="3" name="그림 2">
+            <a:extLst>
+              <a:ext uri="{FF2B5EF4-FFF2-40B4-BE49-F238E27FC236}">
+                <a16:creationId xmlns:a16="http://schemas.microsoft.com/office/drawing/2014/main" id="{B666EC70-880B-E0E1-C672-9EF963B3E9C2}"/>
+              </a:ext>
+            </a:extLst>
+          </p:cNvPr>
+          <p:cNvPicPr>
+            <a:picLocks noChangeAspect="1"/>
+          </p:cNvPicPr>
+          <p:nvPr/>
+        </p:nvPicPr>
+        <p:blipFill>
+          <a:blip r:embed="rId2"/>
+          <a:stretch>
+            <a:fillRect/>
+          </a:stretch>
+        </p:blipFill>
+        <p:spPr>
+          <a:xfrm>
+            <a:off x="1529333" y="1586143"/>
+            <a:ext cx="9133333" cy="3685714"/>
+          </a:xfrm>
+          <a:prstGeom prst="rect">
+            <a:avLst/>
+          </a:prstGeom>
+        </p:spPr>
+      </p:pic>
     </p:spTree>
     <p:extLst>
       <p:ext uri="{BB962C8B-B14F-4D97-AF65-F5344CB8AC3E}">
-        <p14:creationId xmlns:p14="http://schemas.microsoft.com/office/powerpoint/2010/main" val="2386495230"/>
+        <p14:creationId xmlns:p14="http://schemas.microsoft.com/office/powerpoint/2010/main" val="2118225323"/>
+      </p:ext>
+    </p:extLst>
+  </p:cSld>
+  <p:clrMapOvr>
+    <a:masterClrMapping/>
+  </p:clrMapOvr>
+</p:sld>
+</file>
+
+<file path=ppt/slides/slide46.xml><?xml version="1.0" encoding="utf-8"?>
+<p:sld xmlns:a="http://schemas.openxmlformats.org/drawingml/2006/main" xmlns:r="http://schemas.openxmlformats.org/officeDocument/2006/relationships" xmlns:p="http://schemas.openxmlformats.org/presentationml/2006/main">
+  <p:cSld>
+    <p:spTree>
+      <p:nvGrpSpPr>
+        <p:cNvPr id="1" name=""/>
+        <p:cNvGrpSpPr/>
+        <p:nvPr/>
+      </p:nvGrpSpPr>
+      <p:grpSpPr>
+        <a:xfrm>
+          <a:off x="0" y="0"/>
+          <a:ext cx="0" cy="0"/>
+          <a:chOff x="0" y="0"/>
+          <a:chExt cx="0" cy="0"/>
+        </a:xfrm>
+      </p:grpSpPr>
+      <p:sp>
+        <p:nvSpPr>
+          <p:cNvPr id="2" name="TextBox 1">
+            <a:extLst>
+              <a:ext uri="{FF2B5EF4-FFF2-40B4-BE49-F238E27FC236}">
+                <a16:creationId xmlns:a16="http://schemas.microsoft.com/office/drawing/2014/main" id="{8B9E4CAA-6677-0803-D0CB-1724DCCE63B4}"/>
+              </a:ext>
+            </a:extLst>
+          </p:cNvPr>
+          <p:cNvSpPr txBox="1"/>
+          <p:nvPr/>
+        </p:nvSpPr>
+        <p:spPr>
+          <a:xfrm>
+            <a:off x="5057915" y="253628"/>
+            <a:ext cx="2076209" cy="584775"/>
+          </a:xfrm>
+          <a:prstGeom prst="rect">
+            <a:avLst/>
+          </a:prstGeom>
+          <a:noFill/>
+        </p:spPr>
+        <p:txBody>
+          <a:bodyPr wrap="none" rtlCol="0" anchor="ctr">
+            <a:spAutoFit/>
+          </a:bodyPr>
+          <a:lstStyle/>
+          <a:p>
+            <a:pPr algn="ctr"/>
+            <a:r>
+              <a:rPr lang="en-US" altLang="ko-KR" sz="3200" dirty="0"/>
+              <a:t>[</a:t>
+            </a:r>
+            <a:r>
+              <a:rPr lang="ko-KR" altLang="en-US" sz="3200" dirty="0" err="1"/>
+              <a:t>상황재연</a:t>
+            </a:r>
+            <a:r>
+              <a:rPr lang="en-US" altLang="ko-KR" sz="3200" dirty="0"/>
+              <a:t>]</a:t>
+            </a:r>
+          </a:p>
+        </p:txBody>
+      </p:sp>
+      <p:sp>
+        <p:nvSpPr>
+          <p:cNvPr id="4" name="TextBox 2">
+            <a:extLst>
+              <a:ext uri="{FF2B5EF4-FFF2-40B4-BE49-F238E27FC236}">
+                <a16:creationId xmlns:a16="http://schemas.microsoft.com/office/drawing/2014/main" id="{1244FB8D-F7D1-60E7-72B4-8B2DA7253DAA}"/>
+              </a:ext>
+            </a:extLst>
+          </p:cNvPr>
+          <p:cNvSpPr txBox="1"/>
+          <p:nvPr/>
+        </p:nvSpPr>
+        <p:spPr>
+          <a:xfrm>
+            <a:off x="2641438" y="5696431"/>
+            <a:ext cx="6280887" cy="646331"/>
+          </a:xfrm>
+          <a:prstGeom prst="rect">
+            <a:avLst/>
+          </a:prstGeom>
+          <a:noFill/>
+        </p:spPr>
+        <p:txBody>
+          <a:bodyPr wrap="none" rtlCol="0">
+            <a:spAutoFit/>
+          </a:bodyPr>
+          <a:lstStyle>
+            <a:defPPr>
+              <a:defRPr lang="ko-KR"/>
+            </a:defPPr>
+            <a:lvl1pPr marL="0" algn="l" defTabSz="914400" rtl="0" eaLnBrk="1" latinLnBrk="1" hangingPunct="1">
+              <a:defRPr sz="1800" kern="1200">
+                <a:solidFill>
+                  <a:schemeClr val="tx1"/>
+                </a:solidFill>
+                <a:latin typeface="+mn-lt"/>
+                <a:ea typeface="+mn-ea"/>
+                <a:cs typeface="+mn-cs"/>
+              </a:defRPr>
+            </a:lvl1pPr>
+            <a:lvl2pPr marL="457200" algn="l" defTabSz="914400" rtl="0" eaLnBrk="1" latinLnBrk="1" hangingPunct="1">
+              <a:defRPr sz="1800" kern="1200">
+                <a:solidFill>
+                  <a:schemeClr val="tx1"/>
+                </a:solidFill>
+                <a:latin typeface="+mn-lt"/>
+                <a:ea typeface="+mn-ea"/>
+                <a:cs typeface="+mn-cs"/>
+              </a:defRPr>
+            </a:lvl2pPr>
+            <a:lvl3pPr marL="914400" algn="l" defTabSz="914400" rtl="0" eaLnBrk="1" latinLnBrk="1" hangingPunct="1">
+              <a:defRPr sz="1800" kern="1200">
+                <a:solidFill>
+                  <a:schemeClr val="tx1"/>
+                </a:solidFill>
+                <a:latin typeface="+mn-lt"/>
+                <a:ea typeface="+mn-ea"/>
+                <a:cs typeface="+mn-cs"/>
+              </a:defRPr>
+            </a:lvl3pPr>
+            <a:lvl4pPr marL="1371600" algn="l" defTabSz="914400" rtl="0" eaLnBrk="1" latinLnBrk="1" hangingPunct="1">
+              <a:defRPr sz="1800" kern="1200">
+                <a:solidFill>
+                  <a:schemeClr val="tx1"/>
+                </a:solidFill>
+                <a:latin typeface="+mn-lt"/>
+                <a:ea typeface="+mn-ea"/>
+                <a:cs typeface="+mn-cs"/>
+              </a:defRPr>
+            </a:lvl4pPr>
+            <a:lvl5pPr marL="1828800" algn="l" defTabSz="914400" rtl="0" eaLnBrk="1" latinLnBrk="1" hangingPunct="1">
+              <a:defRPr sz="1800" kern="1200">
+                <a:solidFill>
+                  <a:schemeClr val="tx1"/>
+                </a:solidFill>
+                <a:latin typeface="+mn-lt"/>
+                <a:ea typeface="+mn-ea"/>
+                <a:cs typeface="+mn-cs"/>
+              </a:defRPr>
+            </a:lvl5pPr>
+            <a:lvl6pPr marL="2286000" algn="l" defTabSz="914400" rtl="0" eaLnBrk="1" latinLnBrk="1" hangingPunct="1">
+              <a:defRPr sz="1800" kern="1200">
+                <a:solidFill>
+                  <a:schemeClr val="tx1"/>
+                </a:solidFill>
+                <a:latin typeface="+mn-lt"/>
+                <a:ea typeface="+mn-ea"/>
+                <a:cs typeface="+mn-cs"/>
+              </a:defRPr>
+            </a:lvl6pPr>
+            <a:lvl7pPr marL="2743200" algn="l" defTabSz="914400" rtl="0" eaLnBrk="1" latinLnBrk="1" hangingPunct="1">
+              <a:defRPr sz="1800" kern="1200">
+                <a:solidFill>
+                  <a:schemeClr val="tx1"/>
+                </a:solidFill>
+                <a:latin typeface="+mn-lt"/>
+                <a:ea typeface="+mn-ea"/>
+                <a:cs typeface="+mn-cs"/>
+              </a:defRPr>
+            </a:lvl7pPr>
+            <a:lvl8pPr marL="3200400" algn="l" defTabSz="914400" rtl="0" eaLnBrk="1" latinLnBrk="1" hangingPunct="1">
+              <a:defRPr sz="1800" kern="1200">
+                <a:solidFill>
+                  <a:schemeClr val="tx1"/>
+                </a:solidFill>
+                <a:latin typeface="+mn-lt"/>
+                <a:ea typeface="+mn-ea"/>
+                <a:cs typeface="+mn-cs"/>
+              </a:defRPr>
+            </a:lvl8pPr>
+            <a:lvl9pPr marL="3657600" algn="l" defTabSz="914400" rtl="0" eaLnBrk="1" latinLnBrk="1" hangingPunct="1">
+              <a:defRPr sz="1800" kern="1200">
+                <a:solidFill>
+                  <a:schemeClr val="tx1"/>
+                </a:solidFill>
+                <a:latin typeface="+mn-lt"/>
+                <a:ea typeface="+mn-ea"/>
+                <a:cs typeface="+mn-cs"/>
+              </a:defRPr>
+            </a:lvl9pPr>
+          </a:lstStyle>
+          <a:p>
+            <a:pPr algn="ctr"/>
+            <a:r>
+              <a:rPr lang="ko-KR" altLang="en-US" dirty="0"/>
+              <a:t>강제 푸시는 위험한 옵션이기 때문에 한 번 더 팝업이 뜬다</a:t>
+            </a:r>
+            <a:r>
+              <a:rPr lang="en-US" altLang="ko-KR" dirty="0"/>
+              <a:t>.</a:t>
+            </a:r>
+          </a:p>
+          <a:p>
+            <a:pPr algn="ctr"/>
+            <a:r>
+              <a:rPr lang="ko-KR" altLang="en-US" dirty="0"/>
+              <a:t>이 때 </a:t>
+            </a:r>
+            <a:r>
+              <a:rPr lang="en-US" altLang="ko-KR" dirty="0"/>
+              <a:t>“</a:t>
+            </a:r>
+            <a:r>
+              <a:rPr lang="ko-KR" altLang="en-US" dirty="0"/>
+              <a:t>예</a:t>
+            </a:r>
+            <a:r>
+              <a:rPr lang="en-US" altLang="ko-KR" dirty="0"/>
+              <a:t>”</a:t>
+            </a:r>
+            <a:r>
+              <a:rPr lang="ko-KR" altLang="en-US" dirty="0"/>
+              <a:t>를 선택한다</a:t>
+            </a:r>
+            <a:r>
+              <a:rPr lang="en-US" altLang="ko-KR" dirty="0"/>
+              <a:t>.</a:t>
+            </a:r>
+          </a:p>
+        </p:txBody>
+      </p:sp>
+      <p:pic>
+        <p:nvPicPr>
+          <p:cNvPr id="5" name="그림 4">
+            <a:extLst>
+              <a:ext uri="{FF2B5EF4-FFF2-40B4-BE49-F238E27FC236}">
+                <a16:creationId xmlns:a16="http://schemas.microsoft.com/office/drawing/2014/main" id="{2734C042-6FEB-0B7C-2E29-EC7AA430D074}"/>
+              </a:ext>
+            </a:extLst>
+          </p:cNvPr>
+          <p:cNvPicPr>
+            <a:picLocks noChangeAspect="1"/>
+          </p:cNvPicPr>
+          <p:nvPr/>
+        </p:nvPicPr>
+        <p:blipFill>
+          <a:blip r:embed="rId2"/>
+          <a:stretch>
+            <a:fillRect/>
+          </a:stretch>
+        </p:blipFill>
+        <p:spPr>
+          <a:xfrm>
+            <a:off x="1657905" y="1771857"/>
+            <a:ext cx="8876190" cy="3314286"/>
+          </a:xfrm>
+          <a:prstGeom prst="rect">
+            <a:avLst/>
+          </a:prstGeom>
+        </p:spPr>
+      </p:pic>
+    </p:spTree>
+    <p:extLst>
+      <p:ext uri="{BB962C8B-B14F-4D97-AF65-F5344CB8AC3E}">
+        <p14:creationId xmlns:p14="http://schemas.microsoft.com/office/powerpoint/2010/main" val="2206776522"/>
+      </p:ext>
+    </p:extLst>
+  </p:cSld>
+  <p:clrMapOvr>
+    <a:masterClrMapping/>
+  </p:clrMapOvr>
+</p:sld>
+</file>
+
+<file path=ppt/slides/slide47.xml><?xml version="1.0" encoding="utf-8"?>
+<p:sld xmlns:a="http://schemas.openxmlformats.org/drawingml/2006/main" xmlns:r="http://schemas.openxmlformats.org/officeDocument/2006/relationships" xmlns:p="http://schemas.openxmlformats.org/presentationml/2006/main">
+  <p:cSld>
+    <p:spTree>
+      <p:nvGrpSpPr>
+        <p:cNvPr id="1" name=""/>
+        <p:cNvGrpSpPr/>
+        <p:nvPr/>
+      </p:nvGrpSpPr>
+      <p:grpSpPr>
+        <a:xfrm>
+          <a:off x="0" y="0"/>
+          <a:ext cx="0" cy="0"/>
+          <a:chOff x="0" y="0"/>
+          <a:chExt cx="0" cy="0"/>
+        </a:xfrm>
+      </p:grpSpPr>
+      <p:sp>
+        <p:nvSpPr>
+          <p:cNvPr id="2" name="TextBox 1">
+            <a:extLst>
+              <a:ext uri="{FF2B5EF4-FFF2-40B4-BE49-F238E27FC236}">
+                <a16:creationId xmlns:a16="http://schemas.microsoft.com/office/drawing/2014/main" id="{8B9E4CAA-6677-0803-D0CB-1724DCCE63B4}"/>
+              </a:ext>
+            </a:extLst>
+          </p:cNvPr>
+          <p:cNvSpPr txBox="1"/>
+          <p:nvPr/>
+        </p:nvSpPr>
+        <p:spPr>
+          <a:xfrm>
+            <a:off x="5057915" y="253628"/>
+            <a:ext cx="2076209" cy="584775"/>
+          </a:xfrm>
+          <a:prstGeom prst="rect">
+            <a:avLst/>
+          </a:prstGeom>
+          <a:noFill/>
+        </p:spPr>
+        <p:txBody>
+          <a:bodyPr wrap="none" rtlCol="0" anchor="ctr">
+            <a:spAutoFit/>
+          </a:bodyPr>
+          <a:lstStyle/>
+          <a:p>
+            <a:pPr algn="ctr"/>
+            <a:r>
+              <a:rPr lang="en-US" altLang="ko-KR" sz="3200" dirty="0"/>
+              <a:t>[</a:t>
+            </a:r>
+            <a:r>
+              <a:rPr lang="ko-KR" altLang="en-US" sz="3200" dirty="0" err="1"/>
+              <a:t>상황재연</a:t>
+            </a:r>
+            <a:r>
+              <a:rPr lang="en-US" altLang="ko-KR" sz="3200" dirty="0"/>
+              <a:t>]</a:t>
+            </a:r>
+          </a:p>
+        </p:txBody>
+      </p:sp>
+      <p:sp>
+        <p:nvSpPr>
+          <p:cNvPr id="4" name="TextBox 2">
+            <a:extLst>
+              <a:ext uri="{FF2B5EF4-FFF2-40B4-BE49-F238E27FC236}">
+                <a16:creationId xmlns:a16="http://schemas.microsoft.com/office/drawing/2014/main" id="{1244FB8D-F7D1-60E7-72B4-8B2DA7253DAA}"/>
+              </a:ext>
+            </a:extLst>
+          </p:cNvPr>
+          <p:cNvSpPr txBox="1"/>
+          <p:nvPr/>
+        </p:nvSpPr>
+        <p:spPr>
+          <a:xfrm>
+            <a:off x="442323" y="5696431"/>
+            <a:ext cx="10679142" cy="646331"/>
+          </a:xfrm>
+          <a:prstGeom prst="rect">
+            <a:avLst/>
+          </a:prstGeom>
+          <a:noFill/>
+        </p:spPr>
+        <p:txBody>
+          <a:bodyPr wrap="none" rtlCol="0">
+            <a:spAutoFit/>
+          </a:bodyPr>
+          <a:lstStyle>
+            <a:defPPr>
+              <a:defRPr lang="ko-KR"/>
+            </a:defPPr>
+            <a:lvl1pPr marL="0" algn="l" defTabSz="914400" rtl="0" eaLnBrk="1" latinLnBrk="1" hangingPunct="1">
+              <a:defRPr sz="1800" kern="1200">
+                <a:solidFill>
+                  <a:schemeClr val="tx1"/>
+                </a:solidFill>
+                <a:latin typeface="+mn-lt"/>
+                <a:ea typeface="+mn-ea"/>
+                <a:cs typeface="+mn-cs"/>
+              </a:defRPr>
+            </a:lvl1pPr>
+            <a:lvl2pPr marL="457200" algn="l" defTabSz="914400" rtl="0" eaLnBrk="1" latinLnBrk="1" hangingPunct="1">
+              <a:defRPr sz="1800" kern="1200">
+                <a:solidFill>
+                  <a:schemeClr val="tx1"/>
+                </a:solidFill>
+                <a:latin typeface="+mn-lt"/>
+                <a:ea typeface="+mn-ea"/>
+                <a:cs typeface="+mn-cs"/>
+              </a:defRPr>
+            </a:lvl2pPr>
+            <a:lvl3pPr marL="914400" algn="l" defTabSz="914400" rtl="0" eaLnBrk="1" latinLnBrk="1" hangingPunct="1">
+              <a:defRPr sz="1800" kern="1200">
+                <a:solidFill>
+                  <a:schemeClr val="tx1"/>
+                </a:solidFill>
+                <a:latin typeface="+mn-lt"/>
+                <a:ea typeface="+mn-ea"/>
+                <a:cs typeface="+mn-cs"/>
+              </a:defRPr>
+            </a:lvl3pPr>
+            <a:lvl4pPr marL="1371600" algn="l" defTabSz="914400" rtl="0" eaLnBrk="1" latinLnBrk="1" hangingPunct="1">
+              <a:defRPr sz="1800" kern="1200">
+                <a:solidFill>
+                  <a:schemeClr val="tx1"/>
+                </a:solidFill>
+                <a:latin typeface="+mn-lt"/>
+                <a:ea typeface="+mn-ea"/>
+                <a:cs typeface="+mn-cs"/>
+              </a:defRPr>
+            </a:lvl4pPr>
+            <a:lvl5pPr marL="1828800" algn="l" defTabSz="914400" rtl="0" eaLnBrk="1" latinLnBrk="1" hangingPunct="1">
+              <a:defRPr sz="1800" kern="1200">
+                <a:solidFill>
+                  <a:schemeClr val="tx1"/>
+                </a:solidFill>
+                <a:latin typeface="+mn-lt"/>
+                <a:ea typeface="+mn-ea"/>
+                <a:cs typeface="+mn-cs"/>
+              </a:defRPr>
+            </a:lvl5pPr>
+            <a:lvl6pPr marL="2286000" algn="l" defTabSz="914400" rtl="0" eaLnBrk="1" latinLnBrk="1" hangingPunct="1">
+              <a:defRPr sz="1800" kern="1200">
+                <a:solidFill>
+                  <a:schemeClr val="tx1"/>
+                </a:solidFill>
+                <a:latin typeface="+mn-lt"/>
+                <a:ea typeface="+mn-ea"/>
+                <a:cs typeface="+mn-cs"/>
+              </a:defRPr>
+            </a:lvl6pPr>
+            <a:lvl7pPr marL="2743200" algn="l" defTabSz="914400" rtl="0" eaLnBrk="1" latinLnBrk="1" hangingPunct="1">
+              <a:defRPr sz="1800" kern="1200">
+                <a:solidFill>
+                  <a:schemeClr val="tx1"/>
+                </a:solidFill>
+                <a:latin typeface="+mn-lt"/>
+                <a:ea typeface="+mn-ea"/>
+                <a:cs typeface="+mn-cs"/>
+              </a:defRPr>
+            </a:lvl7pPr>
+            <a:lvl8pPr marL="3200400" algn="l" defTabSz="914400" rtl="0" eaLnBrk="1" latinLnBrk="1" hangingPunct="1">
+              <a:defRPr sz="1800" kern="1200">
+                <a:solidFill>
+                  <a:schemeClr val="tx1"/>
+                </a:solidFill>
+                <a:latin typeface="+mn-lt"/>
+                <a:ea typeface="+mn-ea"/>
+                <a:cs typeface="+mn-cs"/>
+              </a:defRPr>
+            </a:lvl8pPr>
+            <a:lvl9pPr marL="3657600" algn="l" defTabSz="914400" rtl="0" eaLnBrk="1" latinLnBrk="1" hangingPunct="1">
+              <a:defRPr sz="1800" kern="1200">
+                <a:solidFill>
+                  <a:schemeClr val="tx1"/>
+                </a:solidFill>
+                <a:latin typeface="+mn-lt"/>
+                <a:ea typeface="+mn-ea"/>
+                <a:cs typeface="+mn-cs"/>
+              </a:defRPr>
+            </a:lvl9pPr>
+          </a:lstStyle>
+          <a:p>
+            <a:pPr algn="ctr"/>
+            <a:r>
+              <a:rPr lang="en-US" altLang="ko-KR" dirty="0"/>
+              <a:t>A</a:t>
+            </a:r>
+            <a:r>
+              <a:rPr lang="ko-KR" altLang="en-US" dirty="0"/>
+              <a:t>컴퓨터 로컬 </a:t>
+            </a:r>
+            <a:r>
+              <a:rPr lang="ko-KR" altLang="en-US" dirty="0" err="1"/>
+              <a:t>레파지토리에서</a:t>
+            </a:r>
+            <a:r>
+              <a:rPr lang="ko-KR" altLang="en-US" dirty="0"/>
+              <a:t> 강제 </a:t>
+            </a:r>
+            <a:r>
+              <a:rPr lang="ko-KR" altLang="en-US" dirty="0" err="1"/>
+              <a:t>푸시가</a:t>
+            </a:r>
+            <a:r>
+              <a:rPr lang="ko-KR" altLang="en-US" dirty="0"/>
+              <a:t> 발생하여 원격 저장소의 </a:t>
+            </a:r>
+            <a:r>
+              <a:rPr lang="en-US" altLang="ko-KR" dirty="0" err="1"/>
+              <a:t>reset_test</a:t>
+            </a:r>
+            <a:r>
+              <a:rPr lang="ko-KR" altLang="en-US" dirty="0" err="1"/>
+              <a:t>브랜치</a:t>
+            </a:r>
+            <a:r>
+              <a:rPr lang="ko-KR" altLang="en-US" dirty="0"/>
+              <a:t> 마지막 </a:t>
+            </a:r>
+            <a:r>
+              <a:rPr lang="ko-KR" altLang="en-US" dirty="0" err="1"/>
+              <a:t>커밋이</a:t>
+            </a:r>
+            <a:endParaRPr lang="en-US" altLang="ko-KR" dirty="0"/>
+          </a:p>
+          <a:p>
+            <a:pPr algn="ctr"/>
+            <a:r>
+              <a:rPr lang="en-US" altLang="ko-KR" dirty="0"/>
+              <a:t>Merge </a:t>
+            </a:r>
+            <a:r>
+              <a:rPr lang="en-US" altLang="ko-KR" dirty="0" err="1"/>
+              <a:t>bracn</a:t>
+            </a:r>
+            <a:r>
+              <a:rPr lang="en-US" altLang="ko-KR" dirty="0"/>
+              <a:t> ‘</a:t>
+            </a:r>
+            <a:r>
+              <a:rPr lang="en-US" altLang="ko-KR" dirty="0" err="1"/>
+              <a:t>daniel</a:t>
+            </a:r>
+            <a:r>
+              <a:rPr lang="en-US" altLang="ko-KR" dirty="0"/>
+              <a:t>’</a:t>
+            </a:r>
+            <a:r>
+              <a:rPr lang="ko-KR" altLang="en-US" dirty="0"/>
+              <a:t>로 변경된 것을 확인할 수 있다</a:t>
+            </a:r>
+            <a:r>
+              <a:rPr lang="en-US" altLang="ko-KR" dirty="0"/>
+              <a:t>.</a:t>
+            </a:r>
+          </a:p>
+        </p:txBody>
+      </p:sp>
+      <p:pic>
+        <p:nvPicPr>
+          <p:cNvPr id="3" name="그림 2">
+            <a:extLst>
+              <a:ext uri="{FF2B5EF4-FFF2-40B4-BE49-F238E27FC236}">
+                <a16:creationId xmlns:a16="http://schemas.microsoft.com/office/drawing/2014/main" id="{1F6C3BFD-89AF-AD33-2257-A46CDBE711A5}"/>
+              </a:ext>
+            </a:extLst>
+          </p:cNvPr>
+          <p:cNvPicPr>
+            <a:picLocks noChangeAspect="1"/>
+          </p:cNvPicPr>
+          <p:nvPr/>
+        </p:nvPicPr>
+        <p:blipFill>
+          <a:blip r:embed="rId2"/>
+          <a:stretch>
+            <a:fillRect/>
+          </a:stretch>
+        </p:blipFill>
+        <p:spPr>
+          <a:xfrm>
+            <a:off x="1391238" y="1743285"/>
+            <a:ext cx="9409524" cy="3371429"/>
+          </a:xfrm>
+          <a:prstGeom prst="rect">
+            <a:avLst/>
+          </a:prstGeom>
+        </p:spPr>
+      </p:pic>
+    </p:spTree>
+    <p:extLst>
+      <p:ext uri="{BB962C8B-B14F-4D97-AF65-F5344CB8AC3E}">
+        <p14:creationId xmlns:p14="http://schemas.microsoft.com/office/powerpoint/2010/main" val="300340456"/>
+      </p:ext>
+    </p:extLst>
+  </p:cSld>
+  <p:clrMapOvr>
+    <a:masterClrMapping/>
+  </p:clrMapOvr>
+</p:sld>
+</file>
+
+<file path=ppt/slides/slide48.xml><?xml version="1.0" encoding="utf-8"?>
+<p:sld xmlns:a="http://schemas.openxmlformats.org/drawingml/2006/main" xmlns:r="http://schemas.openxmlformats.org/officeDocument/2006/relationships" xmlns:p="http://schemas.openxmlformats.org/presentationml/2006/main">
+  <p:cSld>
+    <p:spTree>
+      <p:nvGrpSpPr>
+        <p:cNvPr id="1" name=""/>
+        <p:cNvGrpSpPr/>
+        <p:nvPr/>
+      </p:nvGrpSpPr>
+      <p:grpSpPr>
+        <a:xfrm>
+          <a:off x="0" y="0"/>
+          <a:ext cx="0" cy="0"/>
+          <a:chOff x="0" y="0"/>
+          <a:chExt cx="0" cy="0"/>
+        </a:xfrm>
+      </p:grpSpPr>
+      <p:sp>
+        <p:nvSpPr>
+          <p:cNvPr id="2" name="TextBox 1">
+            <a:extLst>
+              <a:ext uri="{FF2B5EF4-FFF2-40B4-BE49-F238E27FC236}">
+                <a16:creationId xmlns:a16="http://schemas.microsoft.com/office/drawing/2014/main" id="{8B9E4CAA-6677-0803-D0CB-1724DCCE63B4}"/>
+              </a:ext>
+            </a:extLst>
+          </p:cNvPr>
+          <p:cNvSpPr txBox="1"/>
+          <p:nvPr/>
+        </p:nvSpPr>
+        <p:spPr>
+          <a:xfrm>
+            <a:off x="5057915" y="253628"/>
+            <a:ext cx="2076209" cy="584775"/>
+          </a:xfrm>
+          <a:prstGeom prst="rect">
+            <a:avLst/>
+          </a:prstGeom>
+          <a:noFill/>
+        </p:spPr>
+        <p:txBody>
+          <a:bodyPr wrap="none" rtlCol="0" anchor="ctr">
+            <a:spAutoFit/>
+          </a:bodyPr>
+          <a:lstStyle/>
+          <a:p>
+            <a:pPr algn="ctr"/>
+            <a:r>
+              <a:rPr lang="en-US" altLang="ko-KR" sz="3200" dirty="0"/>
+              <a:t>[</a:t>
+            </a:r>
+            <a:r>
+              <a:rPr lang="ko-KR" altLang="en-US" sz="3200" dirty="0" err="1"/>
+              <a:t>상황재연</a:t>
+            </a:r>
+            <a:r>
+              <a:rPr lang="en-US" altLang="ko-KR" sz="3200" dirty="0"/>
+              <a:t>]</a:t>
+            </a:r>
+          </a:p>
+        </p:txBody>
+      </p:sp>
+      <p:sp>
+        <p:nvSpPr>
+          <p:cNvPr id="4" name="TextBox 2">
+            <a:extLst>
+              <a:ext uri="{FF2B5EF4-FFF2-40B4-BE49-F238E27FC236}">
+                <a16:creationId xmlns:a16="http://schemas.microsoft.com/office/drawing/2014/main" id="{1244FB8D-F7D1-60E7-72B4-8B2DA7253DAA}"/>
+              </a:ext>
+            </a:extLst>
+          </p:cNvPr>
+          <p:cNvSpPr txBox="1"/>
+          <p:nvPr/>
+        </p:nvSpPr>
+        <p:spPr>
+          <a:xfrm>
+            <a:off x="3157652" y="5696431"/>
+            <a:ext cx="5248489" cy="369332"/>
+          </a:xfrm>
+          <a:prstGeom prst="rect">
+            <a:avLst/>
+          </a:prstGeom>
+          <a:noFill/>
+        </p:spPr>
+        <p:txBody>
+          <a:bodyPr wrap="none" rtlCol="0">
+            <a:spAutoFit/>
+          </a:bodyPr>
+          <a:lstStyle>
+            <a:defPPr>
+              <a:defRPr lang="ko-KR"/>
+            </a:defPPr>
+            <a:lvl1pPr marL="0" algn="l" defTabSz="914400" rtl="0" eaLnBrk="1" latinLnBrk="1" hangingPunct="1">
+              <a:defRPr sz="1800" kern="1200">
+                <a:solidFill>
+                  <a:schemeClr val="tx1"/>
+                </a:solidFill>
+                <a:latin typeface="+mn-lt"/>
+                <a:ea typeface="+mn-ea"/>
+                <a:cs typeface="+mn-cs"/>
+              </a:defRPr>
+            </a:lvl1pPr>
+            <a:lvl2pPr marL="457200" algn="l" defTabSz="914400" rtl="0" eaLnBrk="1" latinLnBrk="1" hangingPunct="1">
+              <a:defRPr sz="1800" kern="1200">
+                <a:solidFill>
+                  <a:schemeClr val="tx1"/>
+                </a:solidFill>
+                <a:latin typeface="+mn-lt"/>
+                <a:ea typeface="+mn-ea"/>
+                <a:cs typeface="+mn-cs"/>
+              </a:defRPr>
+            </a:lvl2pPr>
+            <a:lvl3pPr marL="914400" algn="l" defTabSz="914400" rtl="0" eaLnBrk="1" latinLnBrk="1" hangingPunct="1">
+              <a:defRPr sz="1800" kern="1200">
+                <a:solidFill>
+                  <a:schemeClr val="tx1"/>
+                </a:solidFill>
+                <a:latin typeface="+mn-lt"/>
+                <a:ea typeface="+mn-ea"/>
+                <a:cs typeface="+mn-cs"/>
+              </a:defRPr>
+            </a:lvl3pPr>
+            <a:lvl4pPr marL="1371600" algn="l" defTabSz="914400" rtl="0" eaLnBrk="1" latinLnBrk="1" hangingPunct="1">
+              <a:defRPr sz="1800" kern="1200">
+                <a:solidFill>
+                  <a:schemeClr val="tx1"/>
+                </a:solidFill>
+                <a:latin typeface="+mn-lt"/>
+                <a:ea typeface="+mn-ea"/>
+                <a:cs typeface="+mn-cs"/>
+              </a:defRPr>
+            </a:lvl4pPr>
+            <a:lvl5pPr marL="1828800" algn="l" defTabSz="914400" rtl="0" eaLnBrk="1" latinLnBrk="1" hangingPunct="1">
+              <a:defRPr sz="1800" kern="1200">
+                <a:solidFill>
+                  <a:schemeClr val="tx1"/>
+                </a:solidFill>
+                <a:latin typeface="+mn-lt"/>
+                <a:ea typeface="+mn-ea"/>
+                <a:cs typeface="+mn-cs"/>
+              </a:defRPr>
+            </a:lvl5pPr>
+            <a:lvl6pPr marL="2286000" algn="l" defTabSz="914400" rtl="0" eaLnBrk="1" latinLnBrk="1" hangingPunct="1">
+              <a:defRPr sz="1800" kern="1200">
+                <a:solidFill>
+                  <a:schemeClr val="tx1"/>
+                </a:solidFill>
+                <a:latin typeface="+mn-lt"/>
+                <a:ea typeface="+mn-ea"/>
+                <a:cs typeface="+mn-cs"/>
+              </a:defRPr>
+            </a:lvl6pPr>
+            <a:lvl7pPr marL="2743200" algn="l" defTabSz="914400" rtl="0" eaLnBrk="1" latinLnBrk="1" hangingPunct="1">
+              <a:defRPr sz="1800" kern="1200">
+                <a:solidFill>
+                  <a:schemeClr val="tx1"/>
+                </a:solidFill>
+                <a:latin typeface="+mn-lt"/>
+                <a:ea typeface="+mn-ea"/>
+                <a:cs typeface="+mn-cs"/>
+              </a:defRPr>
+            </a:lvl7pPr>
+            <a:lvl8pPr marL="3200400" algn="l" defTabSz="914400" rtl="0" eaLnBrk="1" latinLnBrk="1" hangingPunct="1">
+              <a:defRPr sz="1800" kern="1200">
+                <a:solidFill>
+                  <a:schemeClr val="tx1"/>
+                </a:solidFill>
+                <a:latin typeface="+mn-lt"/>
+                <a:ea typeface="+mn-ea"/>
+                <a:cs typeface="+mn-cs"/>
+              </a:defRPr>
+            </a:lvl8pPr>
+            <a:lvl9pPr marL="3657600" algn="l" defTabSz="914400" rtl="0" eaLnBrk="1" latinLnBrk="1" hangingPunct="1">
+              <a:defRPr sz="1800" kern="1200">
+                <a:solidFill>
+                  <a:schemeClr val="tx1"/>
+                </a:solidFill>
+                <a:latin typeface="+mn-lt"/>
+                <a:ea typeface="+mn-ea"/>
+                <a:cs typeface="+mn-cs"/>
+              </a:defRPr>
+            </a:lvl9pPr>
+          </a:lstStyle>
+          <a:p>
+            <a:pPr algn="ctr"/>
+            <a:r>
+              <a:rPr lang="en-US" altLang="ko-KR" dirty="0"/>
+              <a:t>B</a:t>
+            </a:r>
+            <a:r>
+              <a:rPr lang="ko-KR" altLang="en-US" dirty="0"/>
+              <a:t>컴퓨터 로컬 </a:t>
+            </a:r>
+            <a:r>
+              <a:rPr lang="ko-KR" altLang="en-US" dirty="0" err="1"/>
+              <a:t>레파지토리에서</a:t>
+            </a:r>
+            <a:r>
+              <a:rPr lang="en-US" altLang="ko-KR" dirty="0"/>
+              <a:t> fetch</a:t>
+            </a:r>
+            <a:r>
+              <a:rPr lang="ko-KR" altLang="en-US" dirty="0"/>
+              <a:t>를 진행하면</a:t>
+            </a:r>
+            <a:r>
+              <a:rPr lang="en-US" altLang="ko-KR" dirty="0"/>
+              <a:t> </a:t>
+            </a:r>
+          </a:p>
+        </p:txBody>
+      </p:sp>
+    </p:spTree>
+    <p:extLst>
+      <p:ext uri="{BB962C8B-B14F-4D97-AF65-F5344CB8AC3E}">
+        <p14:creationId xmlns:p14="http://schemas.microsoft.com/office/powerpoint/2010/main" val="128568633"/>
+      </p:ext>
+    </p:extLst>
+  </p:cSld>
+  <p:clrMapOvr>
+    <a:masterClrMapping/>
+  </p:clrMapOvr>
+</p:sld>
+</file>
+
+<file path=ppt/slides/slide49.xml><?xml version="1.0" encoding="utf-8"?>
+<p:sld xmlns:a="http://schemas.openxmlformats.org/drawingml/2006/main" xmlns:r="http://schemas.openxmlformats.org/officeDocument/2006/relationships" xmlns:p="http://schemas.openxmlformats.org/presentationml/2006/main">
+  <p:cSld>
+    <p:spTree>
+      <p:nvGrpSpPr>
+        <p:cNvPr id="1" name=""/>
+        <p:cNvGrpSpPr/>
+        <p:nvPr/>
+      </p:nvGrpSpPr>
+      <p:grpSpPr>
+        <a:xfrm>
+          <a:off x="0" y="0"/>
+          <a:ext cx="0" cy="0"/>
+          <a:chOff x="0" y="0"/>
+          <a:chExt cx="0" cy="0"/>
+        </a:xfrm>
+      </p:grpSpPr>
+      <p:sp>
+        <p:nvSpPr>
+          <p:cNvPr id="4" name="TextBox 3">
+            <a:extLst>
+              <a:ext uri="{FF2B5EF4-FFF2-40B4-BE49-F238E27FC236}">
+                <a16:creationId xmlns:a16="http://schemas.microsoft.com/office/drawing/2014/main" id="{0B8A8028-DD3B-7E10-8056-3225EDF81E52}"/>
+              </a:ext>
+            </a:extLst>
+          </p:cNvPr>
+          <p:cNvSpPr txBox="1"/>
+          <p:nvPr/>
+        </p:nvSpPr>
+        <p:spPr>
+          <a:xfrm>
+            <a:off x="167391" y="447994"/>
+            <a:ext cx="3021981" cy="830997"/>
+          </a:xfrm>
+          <a:prstGeom prst="rect">
+            <a:avLst/>
+          </a:prstGeom>
+          <a:noFill/>
+        </p:spPr>
+        <p:txBody>
+          <a:bodyPr wrap="none" rtlCol="0" anchor="ctr">
+            <a:spAutoFit/>
+          </a:bodyPr>
+          <a:lstStyle/>
+          <a:p>
+            <a:pPr algn="ctr"/>
+            <a:r>
+              <a:rPr lang="en-US" altLang="ko-KR" sz="4800" dirty="0"/>
+              <a:t>[</a:t>
+            </a:r>
+            <a:r>
+              <a:rPr lang="ko-KR" altLang="en-US" sz="4800" dirty="0"/>
+              <a:t>참고문헌</a:t>
+            </a:r>
+            <a:r>
+              <a:rPr lang="en-US" altLang="ko-KR" sz="4800" dirty="0"/>
+              <a:t>]</a:t>
+            </a:r>
+            <a:endParaRPr lang="ko-KR" altLang="en-US" sz="4800" dirty="0"/>
+          </a:p>
+        </p:txBody>
+      </p:sp>
+      <p:sp>
+        <p:nvSpPr>
+          <p:cNvPr id="2" name="TextBox 1">
+            <a:extLst>
+              <a:ext uri="{FF2B5EF4-FFF2-40B4-BE49-F238E27FC236}">
+                <a16:creationId xmlns:a16="http://schemas.microsoft.com/office/drawing/2014/main" id="{DCC4737D-F156-02B4-C0DE-1108B5AE9B2D}"/>
+              </a:ext>
+            </a:extLst>
+          </p:cNvPr>
+          <p:cNvSpPr txBox="1"/>
+          <p:nvPr/>
+        </p:nvSpPr>
+        <p:spPr>
+          <a:xfrm>
+            <a:off x="243444" y="1653170"/>
+            <a:ext cx="6538778" cy="646331"/>
+          </a:xfrm>
+          <a:prstGeom prst="rect">
+            <a:avLst/>
+          </a:prstGeom>
+          <a:noFill/>
+        </p:spPr>
+        <p:txBody>
+          <a:bodyPr wrap="none" rtlCol="0">
+            <a:spAutoFit/>
+          </a:bodyPr>
+          <a:lstStyle/>
+          <a:p>
+            <a:r>
+              <a:rPr lang="en-US" altLang="ko-KR" b="0" i="0" dirty="0">
+                <a:solidFill>
+                  <a:srgbClr val="222222"/>
+                </a:solidFill>
+                <a:effectLst/>
+                <a:latin typeface="Noto Sans Medium"/>
+              </a:rPr>
+              <a:t>njs04210, “[Git] reset</a:t>
+            </a:r>
+            <a:r>
+              <a:rPr lang="ko-KR" altLang="en-US" b="0" i="0" dirty="0">
+                <a:solidFill>
+                  <a:srgbClr val="222222"/>
+                </a:solidFill>
+                <a:effectLst/>
+                <a:latin typeface="Noto Sans Medium"/>
+              </a:rPr>
+              <a:t>과 </a:t>
+            </a:r>
+            <a:r>
+              <a:rPr lang="en-US" altLang="ko-KR" b="0" i="0" dirty="0">
+                <a:solidFill>
+                  <a:srgbClr val="222222"/>
+                </a:solidFill>
+                <a:effectLst/>
+                <a:latin typeface="Noto Sans Medium"/>
+              </a:rPr>
+              <a:t>revert </a:t>
+            </a:r>
+            <a:r>
+              <a:rPr lang="ko-KR" altLang="en-US" b="0" i="0" dirty="0">
+                <a:solidFill>
+                  <a:srgbClr val="222222"/>
+                </a:solidFill>
+                <a:effectLst/>
+                <a:latin typeface="Noto Sans Medium"/>
+              </a:rPr>
+              <a:t>알고 사용하기</a:t>
+            </a:r>
+            <a:r>
+              <a:rPr lang="en-US" altLang="ko-KR" b="0" i="0" dirty="0">
+                <a:solidFill>
+                  <a:srgbClr val="222222"/>
+                </a:solidFill>
+                <a:effectLst/>
+                <a:latin typeface="Noto Sans Medium"/>
+              </a:rPr>
+              <a:t>”, </a:t>
+            </a:r>
+            <a:r>
+              <a:rPr lang="en-US" altLang="ko-KR" b="0" i="0" dirty="0" err="1">
+                <a:solidFill>
+                  <a:srgbClr val="222222"/>
+                </a:solidFill>
+                <a:effectLst/>
+                <a:latin typeface="Noto Sans Medium"/>
+              </a:rPr>
+              <a:t>velog</a:t>
+            </a:r>
+            <a:r>
+              <a:rPr lang="en-US" altLang="ko-KR" b="0" i="0" dirty="0">
+                <a:solidFill>
+                  <a:srgbClr val="222222"/>
+                </a:solidFill>
+                <a:effectLst/>
+                <a:latin typeface="Noto Sans Medium"/>
+              </a:rPr>
+              <a:t>, 2021.01.12.,</a:t>
+            </a:r>
+          </a:p>
+          <a:p>
+            <a:r>
+              <a:rPr lang="en-US" altLang="ko-KR" dirty="0">
+                <a:solidFill>
+                  <a:srgbClr val="222222"/>
+                </a:solidFill>
+                <a:latin typeface="Noto Sans Medium"/>
+              </a:rPr>
+              <a:t> </a:t>
+            </a:r>
+            <a:r>
+              <a:rPr lang="en-US" altLang="ko-KR" b="0" i="0" dirty="0">
+                <a:solidFill>
+                  <a:srgbClr val="222222"/>
+                </a:solidFill>
+                <a:effectLst/>
+                <a:latin typeface="Noto Sans Medium"/>
+              </a:rPr>
+              <a:t>&lt;https://velog.io/@njs04210/Git-reset</a:t>
+            </a:r>
+            <a:r>
+              <a:rPr lang="ko-KR" altLang="en-US" b="0" i="0" dirty="0">
+                <a:solidFill>
+                  <a:srgbClr val="222222"/>
+                </a:solidFill>
+                <a:effectLst/>
+                <a:latin typeface="Noto Sans Medium"/>
+              </a:rPr>
+              <a:t>과</a:t>
+            </a:r>
+            <a:r>
+              <a:rPr lang="en-US" altLang="ko-KR" b="0" i="0" dirty="0">
+                <a:solidFill>
+                  <a:srgbClr val="222222"/>
+                </a:solidFill>
+                <a:effectLst/>
+                <a:latin typeface="Noto Sans Medium"/>
+              </a:rPr>
+              <a:t>-revert-</a:t>
+            </a:r>
+            <a:r>
+              <a:rPr lang="ko-KR" altLang="en-US" b="0" i="0" dirty="0">
+                <a:solidFill>
+                  <a:srgbClr val="222222"/>
+                </a:solidFill>
+                <a:effectLst/>
+                <a:latin typeface="Noto Sans Medium"/>
+              </a:rPr>
+              <a:t>알고</a:t>
+            </a:r>
+            <a:r>
+              <a:rPr lang="en-US" altLang="ko-KR" b="0" i="0" dirty="0">
+                <a:solidFill>
+                  <a:srgbClr val="222222"/>
+                </a:solidFill>
+                <a:effectLst/>
+                <a:latin typeface="Noto Sans Medium"/>
+              </a:rPr>
+              <a:t>-</a:t>
+            </a:r>
+            <a:r>
+              <a:rPr lang="ko-KR" altLang="en-US" b="0" i="0" dirty="0">
+                <a:solidFill>
+                  <a:srgbClr val="222222"/>
+                </a:solidFill>
+                <a:effectLst/>
+                <a:latin typeface="Noto Sans Medium"/>
+              </a:rPr>
+              <a:t>사용하기 </a:t>
+            </a:r>
+            <a:r>
+              <a:rPr lang="en-US" altLang="ko-KR" b="0" i="0" dirty="0">
+                <a:solidFill>
+                  <a:srgbClr val="222222"/>
+                </a:solidFill>
+                <a:effectLst/>
+                <a:latin typeface="Noto Sans Medium"/>
+              </a:rPr>
+              <a:t>&gt;.</a:t>
+            </a:r>
+            <a:endParaRPr lang="ko-KR" altLang="en-US" b="0" i="0" dirty="0">
+              <a:solidFill>
+                <a:srgbClr val="222222"/>
+              </a:solidFill>
+              <a:effectLst/>
+              <a:latin typeface="Noto Sans Medium"/>
+            </a:endParaRPr>
+          </a:p>
+        </p:txBody>
+      </p:sp>
+      <p:sp>
+        <p:nvSpPr>
+          <p:cNvPr id="3" name="TextBox 2">
+            <a:extLst>
+              <a:ext uri="{FF2B5EF4-FFF2-40B4-BE49-F238E27FC236}">
+                <a16:creationId xmlns:a16="http://schemas.microsoft.com/office/drawing/2014/main" id="{EE5B0F74-71D4-B2A2-0C83-E51B834C234F}"/>
+              </a:ext>
+            </a:extLst>
+          </p:cNvPr>
+          <p:cNvSpPr txBox="1"/>
+          <p:nvPr/>
+        </p:nvSpPr>
+        <p:spPr>
+          <a:xfrm>
+            <a:off x="243444" y="2673680"/>
+            <a:ext cx="9556334" cy="369332"/>
+          </a:xfrm>
+          <a:prstGeom prst="rect">
+            <a:avLst/>
+          </a:prstGeom>
+          <a:noFill/>
+        </p:spPr>
+        <p:txBody>
+          <a:bodyPr wrap="none" rtlCol="0">
+            <a:spAutoFit/>
+          </a:bodyPr>
+          <a:lstStyle/>
+          <a:p>
+            <a:r>
+              <a:rPr lang="ko-KR" altLang="en-US" dirty="0" err="1">
+                <a:solidFill>
+                  <a:srgbClr val="222222"/>
+                </a:solidFill>
+                <a:latin typeface="Noto Sans Medium"/>
+              </a:rPr>
+              <a:t>무사덤벨레</a:t>
+            </a:r>
+            <a:r>
+              <a:rPr lang="en-US" altLang="ko-KR" dirty="0">
+                <a:solidFill>
+                  <a:srgbClr val="222222"/>
+                </a:solidFill>
+                <a:latin typeface="Noto Sans Medium"/>
+              </a:rPr>
+              <a:t>, </a:t>
+            </a:r>
+            <a:r>
+              <a:rPr lang="en-US" altLang="ko-KR" b="0" i="0" dirty="0">
+                <a:solidFill>
+                  <a:srgbClr val="222222"/>
+                </a:solidFill>
+                <a:effectLst/>
+                <a:latin typeface="Noto Sans Medium"/>
+              </a:rPr>
+              <a:t>“[Git] reset</a:t>
+            </a:r>
+            <a:r>
+              <a:rPr lang="ko-KR" altLang="en-US" b="0" i="0" dirty="0">
+                <a:solidFill>
+                  <a:srgbClr val="222222"/>
+                </a:solidFill>
+                <a:effectLst/>
+                <a:latin typeface="Noto Sans Medium"/>
+              </a:rPr>
+              <a:t>과 </a:t>
+            </a:r>
+            <a:r>
+              <a:rPr lang="en-US" altLang="ko-KR" b="0" i="0" dirty="0">
+                <a:solidFill>
+                  <a:srgbClr val="222222"/>
+                </a:solidFill>
+                <a:effectLst/>
+                <a:latin typeface="Noto Sans Medium"/>
+              </a:rPr>
+              <a:t>git revert”, </a:t>
+            </a:r>
+            <a:r>
+              <a:rPr lang="ko-KR" altLang="en-US" b="0" i="0" dirty="0">
+                <a:solidFill>
+                  <a:srgbClr val="222222"/>
+                </a:solidFill>
+                <a:effectLst/>
+                <a:latin typeface="Noto Sans Medium"/>
+              </a:rPr>
+              <a:t>티스토리</a:t>
+            </a:r>
+            <a:r>
+              <a:rPr lang="en-US" altLang="ko-KR" b="0" i="0" dirty="0">
+                <a:solidFill>
+                  <a:srgbClr val="222222"/>
+                </a:solidFill>
+                <a:effectLst/>
+                <a:latin typeface="Noto Sans Medium"/>
+              </a:rPr>
+              <a:t>, 2022.02.18., &lt;</a:t>
+            </a:r>
+            <a:r>
+              <a:rPr lang="en-US" altLang="ko-KR" dirty="0">
+                <a:latin typeface="NotoSansKR"/>
+              </a:rPr>
+              <a:t> </a:t>
+            </a:r>
+            <a:r>
+              <a:rPr lang="en-US" altLang="ko-KR" b="0" i="0" u="none" strike="noStrike" dirty="0">
+                <a:effectLst/>
+                <a:latin typeface="NotoSansKR"/>
+              </a:rPr>
+              <a:t>https://hajoung56.tistory.com/31 </a:t>
+            </a:r>
+            <a:r>
+              <a:rPr lang="en-US" altLang="ko-KR" b="0" i="0" dirty="0">
+                <a:solidFill>
+                  <a:srgbClr val="222222"/>
+                </a:solidFill>
+                <a:effectLst/>
+                <a:latin typeface="Noto Sans Medium"/>
+              </a:rPr>
+              <a:t>&gt;.</a:t>
+            </a:r>
+            <a:endParaRPr lang="ko-KR" altLang="en-US" b="0" i="0" dirty="0">
+              <a:solidFill>
+                <a:srgbClr val="222222"/>
+              </a:solidFill>
+              <a:effectLst/>
+              <a:latin typeface="Noto Sans Medium"/>
+            </a:endParaRPr>
+          </a:p>
+        </p:txBody>
+      </p:sp>
+      <p:sp>
+        <p:nvSpPr>
+          <p:cNvPr id="5" name="TextBox 4">
+            <a:extLst>
+              <a:ext uri="{FF2B5EF4-FFF2-40B4-BE49-F238E27FC236}">
+                <a16:creationId xmlns:a16="http://schemas.microsoft.com/office/drawing/2014/main" id="{D4F74F21-2C2D-617F-744F-BAE063E340C5}"/>
+              </a:ext>
+            </a:extLst>
+          </p:cNvPr>
+          <p:cNvSpPr txBox="1"/>
+          <p:nvPr/>
+        </p:nvSpPr>
+        <p:spPr>
+          <a:xfrm>
+            <a:off x="243444" y="3417191"/>
+            <a:ext cx="7359964" cy="646331"/>
+          </a:xfrm>
+          <a:prstGeom prst="rect">
+            <a:avLst/>
+          </a:prstGeom>
+          <a:noFill/>
+        </p:spPr>
+        <p:txBody>
+          <a:bodyPr wrap="none" rtlCol="0">
+            <a:spAutoFit/>
+          </a:bodyPr>
+          <a:lstStyle/>
+          <a:p>
+            <a:r>
+              <a:rPr lang="ko-KR" altLang="en-US" dirty="0">
+                <a:solidFill>
+                  <a:srgbClr val="222222"/>
+                </a:solidFill>
+                <a:latin typeface="Noto Sans Medium"/>
+              </a:rPr>
+              <a:t>막무가내막내</a:t>
+            </a:r>
+            <a:r>
+              <a:rPr lang="en-US" altLang="ko-KR" dirty="0">
+                <a:solidFill>
+                  <a:srgbClr val="222222"/>
+                </a:solidFill>
+                <a:latin typeface="Noto Sans Medium"/>
+              </a:rPr>
+              <a:t>, </a:t>
+            </a:r>
+            <a:r>
+              <a:rPr lang="en-US" altLang="ko-KR" b="0" i="0" dirty="0">
+                <a:solidFill>
+                  <a:srgbClr val="222222"/>
+                </a:solidFill>
+                <a:effectLst/>
+                <a:latin typeface="Noto Sans Medium"/>
+              </a:rPr>
+              <a:t>“[Git] Reset, Revert </a:t>
+            </a:r>
+            <a:r>
+              <a:rPr lang="ko-KR" altLang="en-US" b="0" i="0" dirty="0">
+                <a:solidFill>
+                  <a:srgbClr val="222222"/>
+                </a:solidFill>
+                <a:effectLst/>
+                <a:latin typeface="Noto Sans Medium"/>
+              </a:rPr>
+              <a:t>차이 간략정리</a:t>
+            </a:r>
+            <a:r>
+              <a:rPr lang="en-US" altLang="ko-KR" b="0" i="0" dirty="0">
+                <a:solidFill>
+                  <a:srgbClr val="222222"/>
+                </a:solidFill>
+                <a:effectLst/>
+                <a:latin typeface="Noto Sans Medium"/>
+              </a:rPr>
+              <a:t>”, </a:t>
+            </a:r>
+            <a:r>
+              <a:rPr lang="ko-KR" altLang="en-US" b="0" i="0" dirty="0">
+                <a:solidFill>
+                  <a:srgbClr val="222222"/>
+                </a:solidFill>
+                <a:effectLst/>
+                <a:latin typeface="Noto Sans Medium"/>
+              </a:rPr>
+              <a:t>티스토리</a:t>
+            </a:r>
+            <a:r>
+              <a:rPr lang="en-US" altLang="ko-KR" b="0" i="0" dirty="0">
+                <a:solidFill>
+                  <a:srgbClr val="222222"/>
+                </a:solidFill>
+                <a:effectLst/>
+                <a:latin typeface="Noto Sans Medium"/>
+              </a:rPr>
+              <a:t>, 2020.03.20.,</a:t>
+            </a:r>
+          </a:p>
+          <a:p>
+            <a:r>
+              <a:rPr lang="en-US" altLang="ko-KR" b="0" i="0" dirty="0">
+                <a:solidFill>
+                  <a:srgbClr val="222222"/>
+                </a:solidFill>
+                <a:effectLst/>
+                <a:latin typeface="Noto Sans Medium"/>
+              </a:rPr>
+              <a:t>&lt;</a:t>
+            </a:r>
+            <a:r>
+              <a:rPr lang="en-US" altLang="ko-KR" dirty="0">
+                <a:latin typeface="NotoSansKR"/>
+              </a:rPr>
+              <a:t> </a:t>
+            </a:r>
+            <a:r>
+              <a:rPr lang="en-US" altLang="ko-KR" b="0" i="0" u="none" strike="noStrike" dirty="0">
+                <a:effectLst/>
+                <a:latin typeface="NotoSansKR"/>
+              </a:rPr>
+              <a:t>https://youngest-programming.tistory.com/220 </a:t>
+            </a:r>
+            <a:r>
+              <a:rPr lang="en-US" altLang="ko-KR" b="0" i="0" dirty="0">
+                <a:solidFill>
+                  <a:srgbClr val="222222"/>
+                </a:solidFill>
+                <a:effectLst/>
+                <a:latin typeface="Noto Sans Medium"/>
+              </a:rPr>
+              <a:t>&gt;.</a:t>
+            </a:r>
+            <a:endParaRPr lang="ko-KR" altLang="en-US" b="0" i="0" dirty="0">
+              <a:solidFill>
+                <a:srgbClr val="222222"/>
+              </a:solidFill>
+              <a:effectLst/>
+              <a:latin typeface="Noto Sans Medium"/>
+            </a:endParaRPr>
+          </a:p>
+        </p:txBody>
+      </p:sp>
+      <p:sp>
+        <p:nvSpPr>
+          <p:cNvPr id="6" name="TextBox 5">
+            <a:extLst>
+              <a:ext uri="{FF2B5EF4-FFF2-40B4-BE49-F238E27FC236}">
+                <a16:creationId xmlns:a16="http://schemas.microsoft.com/office/drawing/2014/main" id="{C7033CA0-2A7A-8560-ADA7-766024368518}"/>
+              </a:ext>
+            </a:extLst>
+          </p:cNvPr>
+          <p:cNvSpPr txBox="1"/>
+          <p:nvPr/>
+        </p:nvSpPr>
+        <p:spPr>
+          <a:xfrm>
+            <a:off x="243444" y="4437701"/>
+            <a:ext cx="10911833" cy="369332"/>
+          </a:xfrm>
+          <a:prstGeom prst="rect">
+            <a:avLst/>
+          </a:prstGeom>
+          <a:noFill/>
+        </p:spPr>
+        <p:txBody>
+          <a:bodyPr wrap="none" rtlCol="0">
+            <a:spAutoFit/>
+          </a:bodyPr>
+          <a:lstStyle/>
+          <a:p>
+            <a:r>
+              <a:rPr lang="en-US" altLang="ko-KR" b="0" i="0" dirty="0">
+                <a:solidFill>
+                  <a:srgbClr val="222222"/>
+                </a:solidFill>
+                <a:effectLst/>
+                <a:latin typeface="Noto Sans Medium"/>
+              </a:rPr>
+              <a:t>“7.7 Git </a:t>
+            </a:r>
+            <a:r>
+              <a:rPr lang="ko-KR" altLang="en-US" b="0" i="0" dirty="0">
+                <a:solidFill>
+                  <a:srgbClr val="222222"/>
+                </a:solidFill>
+                <a:effectLst/>
+                <a:latin typeface="Noto Sans Medium"/>
+              </a:rPr>
+              <a:t>도구 </a:t>
+            </a:r>
+            <a:r>
+              <a:rPr lang="en-US" altLang="ko-KR" b="0" i="0" dirty="0">
+                <a:solidFill>
+                  <a:srgbClr val="222222"/>
+                </a:solidFill>
+                <a:effectLst/>
+                <a:latin typeface="Noto Sans Medium"/>
+              </a:rPr>
+              <a:t>– Reset </a:t>
+            </a:r>
+            <a:r>
+              <a:rPr lang="ko-KR" altLang="en-US" b="0" i="0" dirty="0">
+                <a:solidFill>
+                  <a:srgbClr val="222222"/>
+                </a:solidFill>
+                <a:effectLst/>
+                <a:latin typeface="Noto Sans Medium"/>
+              </a:rPr>
+              <a:t>명확히 알고 가기</a:t>
+            </a:r>
+            <a:r>
+              <a:rPr lang="en-US" altLang="ko-KR" b="0" i="0" dirty="0">
+                <a:solidFill>
+                  <a:srgbClr val="222222"/>
+                </a:solidFill>
+                <a:effectLst/>
+                <a:latin typeface="Noto Sans Medium"/>
+              </a:rPr>
+              <a:t>”, </a:t>
+            </a:r>
+            <a:r>
+              <a:rPr lang="en-US" altLang="ko-KR" dirty="0">
+                <a:solidFill>
+                  <a:srgbClr val="222222"/>
+                </a:solidFill>
+                <a:latin typeface="Noto Sans Medium"/>
+              </a:rPr>
+              <a:t> </a:t>
+            </a:r>
+            <a:r>
+              <a:rPr lang="en-US" altLang="ko-KR" b="0" i="0" dirty="0">
+                <a:solidFill>
+                  <a:srgbClr val="222222"/>
+                </a:solidFill>
+                <a:effectLst/>
+                <a:latin typeface="Noto Sans Medium"/>
+              </a:rPr>
+              <a:t>&lt;</a:t>
+            </a:r>
+            <a:r>
+              <a:rPr lang="en-US" altLang="ko-KR" b="0" i="0" u="none" strike="noStrike" dirty="0">
+                <a:effectLst/>
+                <a:latin typeface="NotoSansKR"/>
+                <a:hlinkClick r:id="rId2"/>
+              </a:rPr>
+              <a:t> </a:t>
+            </a:r>
+            <a:r>
+              <a:rPr lang="en-US" altLang="ko-KR" b="0" i="0" dirty="0">
+                <a:solidFill>
+                  <a:srgbClr val="222222"/>
+                </a:solidFill>
+                <a:effectLst/>
+                <a:latin typeface="Noto Sans Medium"/>
+              </a:rPr>
+              <a:t>https://git-scm.com/book/ko/v2/Git-</a:t>
+            </a:r>
+            <a:r>
+              <a:rPr lang="ko-KR" altLang="en-US" b="0" i="0" dirty="0">
+                <a:solidFill>
+                  <a:srgbClr val="222222"/>
+                </a:solidFill>
+                <a:effectLst/>
+                <a:latin typeface="Noto Sans Medium"/>
+              </a:rPr>
+              <a:t>도구</a:t>
+            </a:r>
+            <a:r>
+              <a:rPr lang="en-US" altLang="ko-KR" b="0" i="0" dirty="0">
+                <a:solidFill>
+                  <a:srgbClr val="222222"/>
+                </a:solidFill>
+                <a:effectLst/>
+                <a:latin typeface="Noto Sans Medium"/>
+              </a:rPr>
+              <a:t>-Reset-</a:t>
+            </a:r>
+            <a:r>
+              <a:rPr lang="ko-KR" altLang="en-US" b="0" i="0" dirty="0">
+                <a:solidFill>
+                  <a:srgbClr val="222222"/>
+                </a:solidFill>
+                <a:effectLst/>
+                <a:latin typeface="Noto Sans Medium"/>
+              </a:rPr>
+              <a:t>명확히</a:t>
+            </a:r>
+            <a:r>
+              <a:rPr lang="en-US" altLang="ko-KR" b="0" i="0" dirty="0">
+                <a:solidFill>
+                  <a:srgbClr val="222222"/>
+                </a:solidFill>
+                <a:effectLst/>
+                <a:latin typeface="Noto Sans Medium"/>
+              </a:rPr>
+              <a:t>-</a:t>
+            </a:r>
+            <a:r>
+              <a:rPr lang="ko-KR" altLang="en-US" b="0" i="0" dirty="0">
+                <a:solidFill>
+                  <a:srgbClr val="222222"/>
+                </a:solidFill>
+                <a:effectLst/>
+                <a:latin typeface="Noto Sans Medium"/>
+              </a:rPr>
+              <a:t>알고</a:t>
+            </a:r>
+            <a:r>
+              <a:rPr lang="en-US" altLang="ko-KR" b="0" i="0" dirty="0">
+                <a:solidFill>
+                  <a:srgbClr val="222222"/>
+                </a:solidFill>
+                <a:effectLst/>
+                <a:latin typeface="Noto Sans Medium"/>
+              </a:rPr>
+              <a:t>-</a:t>
+            </a:r>
+            <a:r>
+              <a:rPr lang="ko-KR" altLang="en-US" b="0" i="0" dirty="0">
+                <a:solidFill>
+                  <a:srgbClr val="222222"/>
+                </a:solidFill>
+                <a:effectLst/>
+                <a:latin typeface="Noto Sans Medium"/>
+              </a:rPr>
+              <a:t>가기 </a:t>
+            </a:r>
+            <a:r>
+              <a:rPr lang="en-US" altLang="ko-KR" b="0" i="0" dirty="0">
+                <a:solidFill>
+                  <a:srgbClr val="222222"/>
+                </a:solidFill>
+                <a:effectLst/>
+                <a:latin typeface="Noto Sans Medium"/>
+              </a:rPr>
+              <a:t>&gt;.</a:t>
+            </a:r>
+            <a:endParaRPr lang="ko-KR" altLang="en-US" b="0" i="0" dirty="0">
+              <a:solidFill>
+                <a:srgbClr val="222222"/>
+              </a:solidFill>
+              <a:effectLst/>
+              <a:latin typeface="Noto Sans Medium"/>
+            </a:endParaRPr>
+          </a:p>
+        </p:txBody>
+      </p:sp>
+      <p:sp>
+        <p:nvSpPr>
+          <p:cNvPr id="7" name="TextBox 6">
+            <a:extLst>
+              <a:ext uri="{FF2B5EF4-FFF2-40B4-BE49-F238E27FC236}">
+                <a16:creationId xmlns:a16="http://schemas.microsoft.com/office/drawing/2014/main" id="{8D8AEAE8-95BC-CA53-5298-DAAD31E42F85}"/>
+              </a:ext>
+            </a:extLst>
+          </p:cNvPr>
+          <p:cNvSpPr txBox="1"/>
+          <p:nvPr/>
+        </p:nvSpPr>
+        <p:spPr>
+          <a:xfrm>
+            <a:off x="243444" y="5181212"/>
+            <a:ext cx="9208996" cy="646331"/>
+          </a:xfrm>
+          <a:prstGeom prst="rect">
+            <a:avLst/>
+          </a:prstGeom>
+          <a:noFill/>
+        </p:spPr>
+        <p:txBody>
+          <a:bodyPr wrap="none" rtlCol="0">
+            <a:spAutoFit/>
+          </a:bodyPr>
+          <a:lstStyle/>
+          <a:p>
+            <a:r>
+              <a:rPr lang="ko-KR" altLang="en-US" dirty="0">
+                <a:solidFill>
+                  <a:srgbClr val="222222"/>
+                </a:solidFill>
+                <a:latin typeface="Noto Sans Medium"/>
+              </a:rPr>
+              <a:t>컴퓨터 탐험가 찰리</a:t>
+            </a:r>
+            <a:r>
+              <a:rPr lang="en-US" altLang="ko-KR" dirty="0">
+                <a:solidFill>
+                  <a:srgbClr val="222222"/>
+                </a:solidFill>
+                <a:latin typeface="Noto Sans Medium"/>
+              </a:rPr>
+              <a:t>, </a:t>
+            </a:r>
+            <a:r>
+              <a:rPr lang="en-US" altLang="ko-KR" b="0" i="0" dirty="0">
+                <a:solidFill>
+                  <a:srgbClr val="222222"/>
+                </a:solidFill>
+                <a:effectLst/>
+                <a:latin typeface="Noto Sans Medium"/>
+              </a:rPr>
+              <a:t>“Git Commit </a:t>
+            </a:r>
+            <a:r>
+              <a:rPr lang="ko-KR" altLang="en-US" b="0" i="0" dirty="0">
+                <a:solidFill>
+                  <a:srgbClr val="222222"/>
+                </a:solidFill>
+                <a:effectLst/>
+                <a:latin typeface="Noto Sans Medium"/>
+              </a:rPr>
+              <a:t>취소 </a:t>
+            </a:r>
+            <a:r>
+              <a:rPr lang="en-US" altLang="ko-KR" b="0" i="0" dirty="0">
+                <a:solidFill>
+                  <a:srgbClr val="222222"/>
+                </a:solidFill>
+                <a:effectLst/>
+                <a:latin typeface="Noto Sans Medium"/>
+              </a:rPr>
+              <a:t>: Reset, Revert </a:t>
+            </a:r>
+            <a:r>
+              <a:rPr lang="ko-KR" altLang="en-US" b="0" i="0" dirty="0">
+                <a:solidFill>
+                  <a:srgbClr val="222222"/>
+                </a:solidFill>
+                <a:effectLst/>
+                <a:latin typeface="Noto Sans Medium"/>
+              </a:rPr>
+              <a:t>개념 이해하기</a:t>
+            </a:r>
+            <a:r>
+              <a:rPr lang="en-US" altLang="ko-KR" b="0" i="0" dirty="0">
+                <a:solidFill>
+                  <a:srgbClr val="222222"/>
+                </a:solidFill>
+                <a:effectLst/>
+                <a:latin typeface="Noto Sans Medium"/>
+              </a:rPr>
+              <a:t>”, </a:t>
+            </a:r>
+            <a:r>
+              <a:rPr lang="ko-KR" altLang="en-US" b="0" i="0" dirty="0">
+                <a:solidFill>
+                  <a:srgbClr val="222222"/>
+                </a:solidFill>
+                <a:effectLst/>
+                <a:latin typeface="Noto Sans Medium"/>
+              </a:rPr>
+              <a:t>티스토리</a:t>
+            </a:r>
+            <a:r>
+              <a:rPr lang="en-US" altLang="ko-KR" b="0" i="0" dirty="0">
+                <a:solidFill>
+                  <a:srgbClr val="222222"/>
+                </a:solidFill>
+                <a:effectLst/>
+                <a:latin typeface="Noto Sans Medium"/>
+              </a:rPr>
+              <a:t>, 2022.07.30.,</a:t>
+            </a:r>
+          </a:p>
+          <a:p>
+            <a:r>
+              <a:rPr lang="en-US" altLang="ko-KR" b="0" i="0" dirty="0">
+                <a:solidFill>
+                  <a:srgbClr val="222222"/>
+                </a:solidFill>
+                <a:effectLst/>
+                <a:latin typeface="Noto Sans Medium"/>
+              </a:rPr>
+              <a:t>&lt;</a:t>
+            </a:r>
+            <a:r>
+              <a:rPr lang="en-US" altLang="ko-KR" dirty="0">
+                <a:latin typeface="NotoSansKR"/>
+              </a:rPr>
+              <a:t> </a:t>
+            </a:r>
+            <a:r>
+              <a:rPr lang="en-US" altLang="ko-KR" b="0" i="0" u="none" strike="noStrike" dirty="0">
+                <a:effectLst/>
+                <a:latin typeface="NotoSansKR"/>
+              </a:rPr>
+              <a:t>https://whitepro.tistory.com/646 </a:t>
+            </a:r>
+            <a:r>
+              <a:rPr lang="en-US" altLang="ko-KR" b="0" i="0" dirty="0">
+                <a:solidFill>
+                  <a:srgbClr val="222222"/>
+                </a:solidFill>
+                <a:effectLst/>
+                <a:latin typeface="Noto Sans Medium"/>
+              </a:rPr>
+              <a:t>&gt;.</a:t>
+            </a:r>
+            <a:endParaRPr lang="ko-KR" altLang="en-US" b="0" i="0" dirty="0">
+              <a:solidFill>
+                <a:srgbClr val="222222"/>
+              </a:solidFill>
+              <a:effectLst/>
+              <a:latin typeface="Noto Sans Medium"/>
+            </a:endParaRPr>
+          </a:p>
+        </p:txBody>
+      </p:sp>
+      <p:sp>
+        <p:nvSpPr>
+          <p:cNvPr id="8" name="TextBox 7">
+            <a:extLst>
+              <a:ext uri="{FF2B5EF4-FFF2-40B4-BE49-F238E27FC236}">
+                <a16:creationId xmlns:a16="http://schemas.microsoft.com/office/drawing/2014/main" id="{2298358D-C2F5-3A48-359F-9BACBE126ECE}"/>
+              </a:ext>
+            </a:extLst>
+          </p:cNvPr>
+          <p:cNvSpPr txBox="1"/>
+          <p:nvPr/>
+        </p:nvSpPr>
+        <p:spPr>
+          <a:xfrm>
+            <a:off x="243444" y="6201722"/>
+            <a:ext cx="11647804" cy="369332"/>
+          </a:xfrm>
+          <a:prstGeom prst="rect">
+            <a:avLst/>
+          </a:prstGeom>
+          <a:noFill/>
+        </p:spPr>
+        <p:txBody>
+          <a:bodyPr wrap="none" rtlCol="0">
+            <a:spAutoFit/>
+          </a:bodyPr>
+          <a:lstStyle/>
+          <a:p>
+            <a:r>
+              <a:rPr lang="ko-KR" altLang="en-US" dirty="0">
+                <a:solidFill>
+                  <a:srgbClr val="222222"/>
+                </a:solidFill>
+                <a:latin typeface="Noto Sans Medium"/>
+              </a:rPr>
+              <a:t>쓸데없는 코딩하기</a:t>
+            </a:r>
+            <a:r>
+              <a:rPr lang="en-US" altLang="ko-KR" dirty="0">
+                <a:solidFill>
+                  <a:srgbClr val="222222"/>
+                </a:solidFill>
+                <a:latin typeface="Noto Sans Medium"/>
+              </a:rPr>
+              <a:t>, </a:t>
+            </a:r>
+            <a:r>
+              <a:rPr lang="en-US" altLang="ko-KR" b="0" i="0" dirty="0">
+                <a:solidFill>
+                  <a:srgbClr val="222222"/>
+                </a:solidFill>
+                <a:effectLst/>
+                <a:latin typeface="Noto Sans Medium"/>
+              </a:rPr>
+              <a:t>“</a:t>
+            </a:r>
+            <a:r>
+              <a:rPr lang="en-US" altLang="ko-KR" b="0" i="0" dirty="0" err="1">
+                <a:solidFill>
+                  <a:srgbClr val="222222"/>
+                </a:solidFill>
+                <a:effectLst/>
+                <a:latin typeface="Noto Sans Medium"/>
+              </a:rPr>
+              <a:t>sourcetree</a:t>
+            </a:r>
+            <a:r>
+              <a:rPr lang="ko-KR" altLang="en-US" b="0" i="0" dirty="0">
+                <a:solidFill>
+                  <a:srgbClr val="222222"/>
+                </a:solidFill>
+                <a:effectLst/>
+                <a:latin typeface="Noto Sans Medium"/>
+              </a:rPr>
+              <a:t>에서 </a:t>
+            </a:r>
+            <a:r>
+              <a:rPr lang="en-US" altLang="ko-KR" b="0" i="0" dirty="0">
+                <a:solidFill>
+                  <a:srgbClr val="222222"/>
+                </a:solidFill>
+                <a:effectLst/>
+                <a:latin typeface="Noto Sans Medium"/>
+              </a:rPr>
+              <a:t>Force Push </a:t>
+            </a:r>
+            <a:r>
+              <a:rPr lang="ko-KR" altLang="en-US" b="0" i="0" dirty="0">
+                <a:solidFill>
+                  <a:srgbClr val="222222"/>
+                </a:solidFill>
+                <a:effectLst/>
+                <a:latin typeface="Noto Sans Medium"/>
+              </a:rPr>
+              <a:t>활성화하기</a:t>
+            </a:r>
+            <a:r>
+              <a:rPr lang="en-US" altLang="ko-KR" b="0" i="0" dirty="0">
+                <a:solidFill>
+                  <a:srgbClr val="222222"/>
+                </a:solidFill>
+                <a:effectLst/>
+                <a:latin typeface="Noto Sans Medium"/>
+              </a:rPr>
+              <a:t>”, </a:t>
+            </a:r>
+            <a:r>
+              <a:rPr lang="ko-KR" altLang="en-US" b="0" i="0" dirty="0">
+                <a:solidFill>
+                  <a:srgbClr val="222222"/>
+                </a:solidFill>
+                <a:effectLst/>
+                <a:latin typeface="Noto Sans Medium"/>
+              </a:rPr>
+              <a:t>티스토리</a:t>
+            </a:r>
+            <a:r>
+              <a:rPr lang="en-US" altLang="ko-KR" b="0" i="0" dirty="0">
+                <a:solidFill>
+                  <a:srgbClr val="222222"/>
+                </a:solidFill>
+                <a:effectLst/>
+                <a:latin typeface="Noto Sans Medium"/>
+              </a:rPr>
+              <a:t>, 2019.05.30., &lt;</a:t>
+            </a:r>
+            <a:r>
+              <a:rPr lang="en-US" altLang="ko-KR" dirty="0">
+                <a:latin typeface="NotoSansKR"/>
+              </a:rPr>
+              <a:t>https://sub0709.tistory.com/77</a:t>
+            </a:r>
+            <a:r>
+              <a:rPr lang="en-US" altLang="ko-KR" b="0" i="0" dirty="0">
+                <a:solidFill>
+                  <a:srgbClr val="222222"/>
+                </a:solidFill>
+                <a:effectLst/>
+                <a:latin typeface="Noto Sans Medium"/>
+              </a:rPr>
+              <a:t>&gt;.</a:t>
+            </a:r>
+            <a:endParaRPr lang="ko-KR" altLang="en-US" b="0" i="0" dirty="0">
+              <a:solidFill>
+                <a:srgbClr val="222222"/>
+              </a:solidFill>
+              <a:effectLst/>
+              <a:latin typeface="Noto Sans Medium"/>
+            </a:endParaRPr>
+          </a:p>
+        </p:txBody>
+      </p:sp>
+    </p:spTree>
+    <p:extLst>
+      <p:ext uri="{BB962C8B-B14F-4D97-AF65-F5344CB8AC3E}">
+        <p14:creationId xmlns:p14="http://schemas.microsoft.com/office/powerpoint/2010/main" val="374911859"/>
       </p:ext>
     </p:extLst>
   </p:cSld>
@@ -33873,6 +35412,73 @@
     <p:extLst>
       <p:ext uri="{BB962C8B-B14F-4D97-AF65-F5344CB8AC3E}">
         <p14:creationId xmlns:p14="http://schemas.microsoft.com/office/powerpoint/2010/main" val="65470169"/>
+      </p:ext>
+    </p:extLst>
+  </p:cSld>
+  <p:clrMapOvr>
+    <a:masterClrMapping/>
+  </p:clrMapOvr>
+</p:sld>
+</file>
+
+<file path=ppt/slides/slide50.xml><?xml version="1.0" encoding="utf-8"?>
+<p:sld xmlns:a="http://schemas.openxmlformats.org/drawingml/2006/main" xmlns:r="http://schemas.openxmlformats.org/officeDocument/2006/relationships" xmlns:p="http://schemas.openxmlformats.org/presentationml/2006/main">
+  <p:cSld>
+    <p:spTree>
+      <p:nvGrpSpPr>
+        <p:cNvPr id="1" name=""/>
+        <p:cNvGrpSpPr/>
+        <p:nvPr/>
+      </p:nvGrpSpPr>
+      <p:grpSpPr>
+        <a:xfrm>
+          <a:off x="0" y="0"/>
+          <a:ext cx="0" cy="0"/>
+          <a:chOff x="0" y="0"/>
+          <a:chExt cx="0" cy="0"/>
+        </a:xfrm>
+      </p:grpSpPr>
+      <p:sp>
+        <p:nvSpPr>
+          <p:cNvPr id="4" name="TextBox 3">
+            <a:extLst>
+              <a:ext uri="{FF2B5EF4-FFF2-40B4-BE49-F238E27FC236}">
+                <a16:creationId xmlns:a16="http://schemas.microsoft.com/office/drawing/2014/main" id="{B8452C05-1494-512C-6C90-1962FBF1EBCF}"/>
+              </a:ext>
+            </a:extLst>
+          </p:cNvPr>
+          <p:cNvSpPr txBox="1"/>
+          <p:nvPr/>
+        </p:nvSpPr>
+        <p:spPr>
+          <a:xfrm>
+            <a:off x="5256123" y="2967335"/>
+            <a:ext cx="1679755" cy="923330"/>
+          </a:xfrm>
+          <a:prstGeom prst="rect">
+            <a:avLst/>
+          </a:prstGeom>
+          <a:noFill/>
+        </p:spPr>
+        <p:txBody>
+          <a:bodyPr wrap="none" rtlCol="0" anchor="ctr">
+            <a:spAutoFit/>
+          </a:bodyPr>
+          <a:lstStyle/>
+          <a:p>
+            <a:pPr algn="ctr"/>
+            <a:r>
+              <a:rPr lang="en-US" altLang="ko-KR" sz="5400" dirty="0"/>
+              <a:t>EOD.</a:t>
+            </a:r>
+            <a:endParaRPr lang="ko-KR" altLang="en-US" sz="5400" dirty="0"/>
+          </a:p>
+        </p:txBody>
+      </p:sp>
+    </p:spTree>
+    <p:extLst>
+      <p:ext uri="{BB962C8B-B14F-4D97-AF65-F5344CB8AC3E}">
+        <p14:creationId xmlns:p14="http://schemas.microsoft.com/office/powerpoint/2010/main" val="2386495230"/>
       </p:ext>
     </p:extLst>
   </p:cSld>

</xml_diff>

<commit_message>
docs : git reset/revert 다듬기
git reset/revert 다듬기
</commit_message>
<xml_diff>
--- a/docs/8. git reset과 revert.pptx
+++ b/docs/8. git reset과 revert.pptx
@@ -1497,7 +1497,7 @@
           <a:p>
             <a:fld id="{EFBA5509-D1D1-47CF-BFB7-E1AA9548D41D}" type="datetimeFigureOut">
               <a:rPr lang="ko-KR" altLang="en-US" smtClean="0"/>
-              <a:t>2022-12-26</a:t>
+              <a:t>2022-12-27</a:t>
             </a:fld>
             <a:endParaRPr lang="ko-KR" altLang="en-US"/>
           </a:p>
@@ -4684,7 +4684,7 @@
           <a:p>
             <a:fld id="{2E2D5BC7-3CC9-4CF8-9043-E85E9F2EC4FF}" type="datetimeFigureOut">
               <a:rPr lang="ko-KR" altLang="en-US" smtClean="0"/>
-              <a:t>2022-12-26</a:t>
+              <a:t>2022-12-27</a:t>
             </a:fld>
             <a:endParaRPr lang="ko-KR" altLang="en-US"/>
           </a:p>
@@ -4882,7 +4882,7 @@
           <a:p>
             <a:fld id="{2E2D5BC7-3CC9-4CF8-9043-E85E9F2EC4FF}" type="datetimeFigureOut">
               <a:rPr lang="ko-KR" altLang="en-US" smtClean="0"/>
-              <a:t>2022-12-26</a:t>
+              <a:t>2022-12-27</a:t>
             </a:fld>
             <a:endParaRPr lang="ko-KR" altLang="en-US"/>
           </a:p>
@@ -5090,7 +5090,7 @@
           <a:p>
             <a:fld id="{2E2D5BC7-3CC9-4CF8-9043-E85E9F2EC4FF}" type="datetimeFigureOut">
               <a:rPr lang="ko-KR" altLang="en-US" smtClean="0"/>
-              <a:t>2022-12-26</a:t>
+              <a:t>2022-12-27</a:t>
             </a:fld>
             <a:endParaRPr lang="ko-KR" altLang="en-US"/>
           </a:p>
@@ -5288,7 +5288,7 @@
           <a:p>
             <a:fld id="{2E2D5BC7-3CC9-4CF8-9043-E85E9F2EC4FF}" type="datetimeFigureOut">
               <a:rPr lang="ko-KR" altLang="en-US" smtClean="0"/>
-              <a:t>2022-12-26</a:t>
+              <a:t>2022-12-27</a:t>
             </a:fld>
             <a:endParaRPr lang="ko-KR" altLang="en-US"/>
           </a:p>
@@ -5563,7 +5563,7 @@
           <a:p>
             <a:fld id="{2E2D5BC7-3CC9-4CF8-9043-E85E9F2EC4FF}" type="datetimeFigureOut">
               <a:rPr lang="ko-KR" altLang="en-US" smtClean="0"/>
-              <a:t>2022-12-26</a:t>
+              <a:t>2022-12-27</a:t>
             </a:fld>
             <a:endParaRPr lang="ko-KR" altLang="en-US"/>
           </a:p>
@@ -5828,7 +5828,7 @@
           <a:p>
             <a:fld id="{2E2D5BC7-3CC9-4CF8-9043-E85E9F2EC4FF}" type="datetimeFigureOut">
               <a:rPr lang="ko-KR" altLang="en-US" smtClean="0"/>
-              <a:t>2022-12-26</a:t>
+              <a:t>2022-12-27</a:t>
             </a:fld>
             <a:endParaRPr lang="ko-KR" altLang="en-US"/>
           </a:p>
@@ -6240,7 +6240,7 @@
           <a:p>
             <a:fld id="{2E2D5BC7-3CC9-4CF8-9043-E85E9F2EC4FF}" type="datetimeFigureOut">
               <a:rPr lang="ko-KR" altLang="en-US" smtClean="0"/>
-              <a:t>2022-12-26</a:t>
+              <a:t>2022-12-27</a:t>
             </a:fld>
             <a:endParaRPr lang="ko-KR" altLang="en-US"/>
           </a:p>
@@ -6381,7 +6381,7 @@
           <a:p>
             <a:fld id="{2E2D5BC7-3CC9-4CF8-9043-E85E9F2EC4FF}" type="datetimeFigureOut">
               <a:rPr lang="ko-KR" altLang="en-US" smtClean="0"/>
-              <a:t>2022-12-26</a:t>
+              <a:t>2022-12-27</a:t>
             </a:fld>
             <a:endParaRPr lang="ko-KR" altLang="en-US"/>
           </a:p>
@@ -6494,7 +6494,7 @@
           <a:p>
             <a:fld id="{2E2D5BC7-3CC9-4CF8-9043-E85E9F2EC4FF}" type="datetimeFigureOut">
               <a:rPr lang="ko-KR" altLang="en-US" smtClean="0"/>
-              <a:t>2022-12-26</a:t>
+              <a:t>2022-12-27</a:t>
             </a:fld>
             <a:endParaRPr lang="ko-KR" altLang="en-US"/>
           </a:p>
@@ -6805,7 +6805,7 @@
           <a:p>
             <a:fld id="{2E2D5BC7-3CC9-4CF8-9043-E85E9F2EC4FF}" type="datetimeFigureOut">
               <a:rPr lang="ko-KR" altLang="en-US" smtClean="0"/>
-              <a:t>2022-12-26</a:t>
+              <a:t>2022-12-27</a:t>
             </a:fld>
             <a:endParaRPr lang="ko-KR" altLang="en-US"/>
           </a:p>
@@ -7093,7 +7093,7 @@
           <a:p>
             <a:fld id="{2E2D5BC7-3CC9-4CF8-9043-E85E9F2EC4FF}" type="datetimeFigureOut">
               <a:rPr lang="ko-KR" altLang="en-US" smtClean="0"/>
-              <a:t>2022-12-26</a:t>
+              <a:t>2022-12-27</a:t>
             </a:fld>
             <a:endParaRPr lang="ko-KR" altLang="en-US"/>
           </a:p>
@@ -7334,7 +7334,7 @@
           <a:p>
             <a:fld id="{2E2D5BC7-3CC9-4CF8-9043-E85E9F2EC4FF}" type="datetimeFigureOut">
               <a:rPr lang="ko-KR" altLang="en-US" smtClean="0"/>
-              <a:t>2022-12-26</a:t>
+              <a:t>2022-12-27</a:t>
             </a:fld>
             <a:endParaRPr lang="ko-KR" altLang="en-US"/>
           </a:p>
@@ -24930,6 +24930,58 @@
           </a:prstGeom>
         </p:spPr>
       </p:pic>
+      <p:sp>
+        <p:nvSpPr>
+          <p:cNvPr id="3" name="직사각형 2">
+            <a:extLst>
+              <a:ext uri="{FF2B5EF4-FFF2-40B4-BE49-F238E27FC236}">
+                <a16:creationId xmlns:a16="http://schemas.microsoft.com/office/drawing/2014/main" id="{22ED555A-652A-2A94-00A1-81DE63A6C54A}"/>
+              </a:ext>
+            </a:extLst>
+          </p:cNvPr>
+          <p:cNvSpPr/>
+          <p:nvPr/>
+        </p:nvSpPr>
+        <p:spPr>
+          <a:xfrm>
+            <a:off x="3568223" y="1572527"/>
+            <a:ext cx="220006" cy="1775690"/>
+          </a:xfrm>
+          <a:prstGeom prst="rect">
+            <a:avLst/>
+          </a:prstGeom>
+          <a:noFill/>
+          <a:ln w="38100">
+            <a:solidFill>
+              <a:srgbClr val="FF0000"/>
+            </a:solidFill>
+          </a:ln>
+        </p:spPr>
+        <p:style>
+          <a:lnRef idx="2">
+            <a:schemeClr val="accent1">
+              <a:shade val="50000"/>
+            </a:schemeClr>
+          </a:lnRef>
+          <a:fillRef idx="1">
+            <a:schemeClr val="accent1"/>
+          </a:fillRef>
+          <a:effectRef idx="0">
+            <a:schemeClr val="accent1"/>
+          </a:effectRef>
+          <a:fontRef idx="minor">
+            <a:schemeClr val="lt1"/>
+          </a:fontRef>
+        </p:style>
+        <p:txBody>
+          <a:bodyPr rtlCol="0" anchor="ctr"/>
+          <a:lstStyle/>
+          <a:p>
+            <a:pPr algn="ctr"/>
+            <a:endParaRPr lang="ko-KR" altLang="en-US"/>
+          </a:p>
+        </p:txBody>
+      </p:sp>
     </p:spTree>
     <p:extLst>
       <p:ext uri="{BB962C8B-B14F-4D97-AF65-F5344CB8AC3E}">

</xml_diff>